<commit_message>
presentation my part done
</commit_message>
<xml_diff>
--- a/Documentation/Präsentation/Präsentation.pptx
+++ b/Documentation/Präsentation/Präsentation.pptx
@@ -5,15 +5,30 @@
     <p:sldMasterId id="2147483648" r:id="rId1"/>
   </p:sldMasterIdLst>
   <p:notesMasterIdLst>
-    <p:notesMasterId r:id="rId5"/>
+    <p:notesMasterId r:id="rId20"/>
   </p:notesMasterIdLst>
   <p:handoutMasterIdLst>
-    <p:handoutMasterId r:id="rId6"/>
+    <p:handoutMasterId r:id="rId21"/>
   </p:handoutMasterIdLst>
   <p:sldIdLst>
     <p:sldId id="369" r:id="rId2"/>
     <p:sldId id="386" r:id="rId3"/>
-    <p:sldId id="387" r:id="rId4"/>
+    <p:sldId id="392" r:id="rId4"/>
+    <p:sldId id="393" r:id="rId5"/>
+    <p:sldId id="387" r:id="rId6"/>
+    <p:sldId id="390" r:id="rId7"/>
+    <p:sldId id="391" r:id="rId8"/>
+    <p:sldId id="394" r:id="rId9"/>
+    <p:sldId id="395" r:id="rId10"/>
+    <p:sldId id="388" r:id="rId11"/>
+    <p:sldId id="396" r:id="rId12"/>
+    <p:sldId id="397" r:id="rId13"/>
+    <p:sldId id="399" r:id="rId14"/>
+    <p:sldId id="398" r:id="rId15"/>
+    <p:sldId id="400" r:id="rId16"/>
+    <p:sldId id="389" r:id="rId17"/>
+    <p:sldId id="401" r:id="rId18"/>
+    <p:sldId id="402" r:id="rId19"/>
   </p:sldIdLst>
   <p:sldSz cx="9144000" cy="6858000" type="screen4x3"/>
   <p:notesSz cx="6648450" cy="9850438"/>
@@ -149,13 +164,28 @@
           <p14:sldIdLst>
             <p14:sldId id="369"/>
             <p14:sldId id="386"/>
+            <p14:sldId id="392"/>
+            <p14:sldId id="393"/>
             <p14:sldId id="387"/>
+            <p14:sldId id="390"/>
+            <p14:sldId id="391"/>
+            <p14:sldId id="394"/>
+            <p14:sldId id="395"/>
+            <p14:sldId id="388"/>
+            <p14:sldId id="396"/>
+            <p14:sldId id="397"/>
+            <p14:sldId id="399"/>
+            <p14:sldId id="398"/>
+            <p14:sldId id="400"/>
+            <p14:sldId id="389"/>
+            <p14:sldId id="401"/>
+            <p14:sldId id="402"/>
           </p14:sldIdLst>
         </p14:section>
       </p14:sectionLst>
     </p:ext>
     <p:ext uri="{EFAFB233-063F-42B5-8137-9DF3F51BA10A}">
-      <p15:sldGuideLst xmlns:p15="http://schemas.microsoft.com/office/powerpoint/2012/main" xmlns="">
+      <p15:sldGuideLst xmlns="" xmlns:p15="http://schemas.microsoft.com/office/powerpoint/2012/main">
         <p15:guide id="1" orient="horz" pos="2160">
           <p15:clr>
             <a:srgbClr val="A4A3A4"/>
@@ -169,7 +199,7 @@
       </p15:sldGuideLst>
     </p:ext>
     <p:ext uri="{2D200454-40CA-4A62-9FC3-DE9A4176ACB9}">
-      <p15:notesGuideLst xmlns:p15="http://schemas.microsoft.com/office/powerpoint/2012/main" xmlns="">
+      <p15:notesGuideLst xmlns="" xmlns:p15="http://schemas.microsoft.com/office/powerpoint/2012/main">
         <p15:guide id="1" orient="horz" pos="3102">
           <p15:clr>
             <a:srgbClr val="A4A3A4"/>
@@ -1342,6 +1372,96 @@
     <p:extLst>
       <p:ext uri="{BB962C8B-B14F-4D97-AF65-F5344CB8AC3E}">
         <p14:creationId xmlns:p14="http://schemas.microsoft.com/office/powerpoint/2010/main" val="2889689878"/>
+      </p:ext>
+    </p:extLst>
+  </p:cSld>
+  <p:clrMapOvr>
+    <a:masterClrMapping/>
+  </p:clrMapOvr>
+</p:notes>
+</file>
+
+<file path=ppt/notesSlides/notesSlide2.xml><?xml version="1.0" encoding="utf-8"?>
+<p:notes xmlns:a="http://schemas.openxmlformats.org/drawingml/2006/main" xmlns:r="http://schemas.openxmlformats.org/officeDocument/2006/relationships" xmlns:p="http://schemas.openxmlformats.org/presentationml/2006/main">
+  <p:cSld>
+    <p:spTree>
+      <p:nvGrpSpPr>
+        <p:cNvPr id="1" name=""/>
+        <p:cNvGrpSpPr/>
+        <p:nvPr/>
+      </p:nvGrpSpPr>
+      <p:grpSpPr>
+        <a:xfrm>
+          <a:off x="0" y="0"/>
+          <a:ext cx="0" cy="0"/>
+          <a:chOff x="0" y="0"/>
+          <a:chExt cx="0" cy="0"/>
+        </a:xfrm>
+      </p:grpSpPr>
+      <p:sp>
+        <p:nvSpPr>
+          <p:cNvPr id="2" name="Folienbildplatzhalter 1"/>
+          <p:cNvSpPr>
+            <a:spLocks noGrp="1" noRot="1" noChangeAspect="1"/>
+          </p:cNvSpPr>
+          <p:nvPr>
+            <p:ph type="sldImg"/>
+          </p:nvPr>
+        </p:nvSpPr>
+        <p:spPr/>
+      </p:sp>
+      <p:sp>
+        <p:nvSpPr>
+          <p:cNvPr id="3" name="Notizenplatzhalter 2"/>
+          <p:cNvSpPr>
+            <a:spLocks noGrp="1"/>
+          </p:cNvSpPr>
+          <p:nvPr>
+            <p:ph type="body" idx="1"/>
+          </p:nvPr>
+        </p:nvSpPr>
+        <p:spPr/>
+        <p:txBody>
+          <a:bodyPr/>
+          <a:lstStyle/>
+          <a:p>
+            <a:endParaRPr lang="de-DE" dirty="0"/>
+          </a:p>
+        </p:txBody>
+      </p:sp>
+      <p:sp>
+        <p:nvSpPr>
+          <p:cNvPr id="4" name="Foliennummernplatzhalter 3"/>
+          <p:cNvSpPr>
+            <a:spLocks noGrp="1"/>
+          </p:cNvSpPr>
+          <p:nvPr>
+            <p:ph type="sldNum" sz="quarter" idx="10"/>
+          </p:nvPr>
+        </p:nvSpPr>
+        <p:spPr/>
+        <p:txBody>
+          <a:bodyPr/>
+          <a:lstStyle/>
+          <a:p>
+            <a:pPr>
+              <a:defRPr/>
+            </a:pPr>
+            <a:fld id="{6094435E-1A02-42B0-A515-CE1259B483F5}" type="slidenum">
+              <a:rPr lang="de-DE" altLang="de-DE" smtClean="0"/>
+              <a:pPr>
+                <a:defRPr/>
+              </a:pPr>
+              <a:t>7</a:t>
+            </a:fld>
+            <a:endParaRPr lang="de-DE" altLang="de-DE"/>
+          </a:p>
+        </p:txBody>
+      </p:sp>
+    </p:spTree>
+    <p:extLst>
+      <p:ext uri="{BB962C8B-B14F-4D97-AF65-F5344CB8AC3E}">
+        <p14:creationId xmlns:p14="http://schemas.microsoft.com/office/powerpoint/2010/main" val="629495398"/>
       </p:ext>
     </p:extLst>
   </p:cSld>
@@ -5011,22 +5131,6 @@
               </a:rPr>
               <a:t>, Christian Weber</a:t>
             </a:r>
-            <a:r>
-              <a:rPr lang="de-DE" altLang="de-DE" sz="1800" dirty="0" smtClean="0">
-                <a:solidFill>
-                  <a:schemeClr val="bg2">
-                    <a:lumMod val="50000"/>
-                  </a:schemeClr>
-                </a:solidFill>
-                <a:effectLst>
-                  <a:outerShdw blurRad="38100" dist="38100" dir="2700000" algn="tl">
-                    <a:srgbClr val="C0C0C0"/>
-                  </a:outerShdw>
-                </a:effectLst>
-                <a:latin typeface="+mj-lt"/>
-              </a:rPr>
-              <a:t/>
-            </a:r>
             <a:br>
               <a:rPr lang="de-DE" altLang="de-DE" sz="1800" dirty="0" smtClean="0">
                 <a:solidFill>
@@ -5066,6 +5170,1649 @@
   <p:clrMapOvr>
     <a:masterClrMapping/>
   </p:clrMapOvr>
+  <p:timing>
+    <p:tnLst>
+      <p:par>
+        <p:cTn id="1" dur="indefinite" restart="never" nodeType="tmRoot"/>
+      </p:par>
+    </p:tnLst>
+  </p:timing>
+</p:sld>
+</file>
+
+<file path=ppt/slides/slide10.xml><?xml version="1.0" encoding="utf-8"?>
+<p:sld xmlns:a="http://schemas.openxmlformats.org/drawingml/2006/main" xmlns:r="http://schemas.openxmlformats.org/officeDocument/2006/relationships" xmlns:p="http://schemas.openxmlformats.org/presentationml/2006/main">
+  <p:cSld>
+    <p:spTree>
+      <p:nvGrpSpPr>
+        <p:cNvPr id="1" name=""/>
+        <p:cNvGrpSpPr/>
+        <p:nvPr/>
+      </p:nvGrpSpPr>
+      <p:grpSpPr>
+        <a:xfrm>
+          <a:off x="0" y="0"/>
+          <a:ext cx="0" cy="0"/>
+          <a:chOff x="0" y="0"/>
+          <a:chExt cx="0" cy="0"/>
+        </a:xfrm>
+      </p:grpSpPr>
+      <p:sp>
+        <p:nvSpPr>
+          <p:cNvPr id="2" name="Titel 1"/>
+          <p:cNvSpPr>
+            <a:spLocks noGrp="1"/>
+          </p:cNvSpPr>
+          <p:nvPr>
+            <p:ph type="title"/>
+          </p:nvPr>
+        </p:nvSpPr>
+        <p:spPr/>
+        <p:txBody>
+          <a:bodyPr/>
+          <a:lstStyle/>
+          <a:p>
+            <a:r>
+              <a:rPr lang="de-DE" dirty="0"/>
+              <a:t>Wann wird übergeben?</a:t>
+            </a:r>
+          </a:p>
+        </p:txBody>
+      </p:sp>
+      <p:sp>
+        <p:nvSpPr>
+          <p:cNvPr id="3" name="Inhaltsplatzhalter 2"/>
+          <p:cNvSpPr>
+            <a:spLocks noGrp="1"/>
+          </p:cNvSpPr>
+          <p:nvPr>
+            <p:ph idx="1"/>
+          </p:nvPr>
+        </p:nvSpPr>
+        <p:spPr/>
+        <p:txBody>
+          <a:bodyPr/>
+          <a:lstStyle/>
+          <a:p>
+            <a:r>
+              <a:rPr lang="de-DE" dirty="0" smtClean="0"/>
+              <a:t>Abwägung der Lösungen</a:t>
+            </a:r>
+          </a:p>
+          <a:p>
+            <a:pPr lvl="1"/>
+            <a:r>
+              <a:rPr lang="de-DE" dirty="0" smtClean="0"/>
+              <a:t>Lösung mit anfahren:</a:t>
+            </a:r>
+          </a:p>
+          <a:p>
+            <a:pPr lvl="2"/>
+            <a:r>
+              <a:rPr lang="de-DE" dirty="0" smtClean="0"/>
+              <a:t>Übersetzen klappt immer</a:t>
+            </a:r>
+          </a:p>
+          <a:p>
+            <a:pPr lvl="2"/>
+            <a:r>
+              <a:rPr lang="de-DE" dirty="0" smtClean="0"/>
+              <a:t>Aber: große Abhängigkeiten</a:t>
+            </a:r>
+          </a:p>
+          <a:p>
+            <a:pPr lvl="2"/>
+            <a:r>
+              <a:rPr lang="de-DE" dirty="0" smtClean="0"/>
+              <a:t>Dadurch deutlich weniger Werkstücke auf der Anlage</a:t>
+            </a:r>
+          </a:p>
+          <a:p>
+            <a:pPr lvl="1"/>
+            <a:r>
+              <a:rPr lang="de-DE" dirty="0" smtClean="0"/>
+              <a:t>Lösung ohne anfahren:</a:t>
+            </a:r>
+          </a:p>
+          <a:p>
+            <a:pPr lvl="2"/>
+            <a:r>
+              <a:rPr lang="de-DE" dirty="0" smtClean="0"/>
+              <a:t>Übersetzen klappt manchmal nicht</a:t>
+            </a:r>
+          </a:p>
+          <a:p>
+            <a:pPr lvl="2"/>
+            <a:r>
+              <a:rPr lang="de-DE" dirty="0" smtClean="0"/>
+              <a:t>Mehr Werkstücke pro </a:t>
+            </a:r>
+            <a:r>
+              <a:rPr lang="de-DE" i="1" dirty="0" err="1" smtClean="0"/>
+              <a:t>stage</a:t>
+            </a:r>
+            <a:endParaRPr lang="de-DE" i="1" dirty="0" smtClean="0"/>
+          </a:p>
+          <a:p>
+            <a:pPr lvl="2"/>
+            <a:r>
+              <a:rPr lang="de-DE" dirty="0" smtClean="0"/>
+              <a:t>Unsere Wahl</a:t>
+            </a:r>
+          </a:p>
+        </p:txBody>
+      </p:sp>
+      <p:sp>
+        <p:nvSpPr>
+          <p:cNvPr id="4" name="Foliennummernplatzhalter 3"/>
+          <p:cNvSpPr>
+            <a:spLocks noGrp="1"/>
+          </p:cNvSpPr>
+          <p:nvPr>
+            <p:ph type="sldNum" sz="quarter" idx="11"/>
+          </p:nvPr>
+        </p:nvSpPr>
+        <p:spPr/>
+        <p:txBody>
+          <a:bodyPr/>
+          <a:lstStyle/>
+          <a:p>
+            <a:fld id="{8F7FB5C4-64A8-4489-A065-F733EF225B1A}" type="slidenum">
+              <a:rPr lang="de-DE" smtClean="0"/>
+              <a:t>10</a:t>
+            </a:fld>
+            <a:endParaRPr lang="de-DE"/>
+          </a:p>
+        </p:txBody>
+      </p:sp>
+      <p:sp>
+        <p:nvSpPr>
+          <p:cNvPr id="5" name="Fußzeilenplatzhalter 4"/>
+          <p:cNvSpPr>
+            <a:spLocks noGrp="1"/>
+          </p:cNvSpPr>
+          <p:nvPr>
+            <p:ph type="ftr" sz="quarter" idx="3"/>
+          </p:nvPr>
+        </p:nvSpPr>
+        <p:spPr/>
+        <p:txBody>
+          <a:bodyPr/>
+          <a:lstStyle/>
+          <a:p>
+            <a:r>
+              <a:rPr lang="en-US" smtClean="0"/>
+              <a:t>Manuel Wurth, Christian Weber – 20.01.2016</a:t>
+            </a:r>
+            <a:endParaRPr lang="de-DE" dirty="0"/>
+          </a:p>
+        </p:txBody>
+      </p:sp>
+    </p:spTree>
+    <p:extLst>
+      <p:ext uri="{BB962C8B-B14F-4D97-AF65-F5344CB8AC3E}">
+        <p14:creationId xmlns:p14="http://schemas.microsoft.com/office/powerpoint/2010/main" val="593335912"/>
+      </p:ext>
+    </p:extLst>
+  </p:cSld>
+  <p:clrMapOvr>
+    <a:masterClrMapping/>
+  </p:clrMapOvr>
+  <p:transition spd="med"/>
+  <p:timing>
+    <p:tnLst>
+      <p:par>
+        <p:cTn id="1" dur="indefinite" restart="never" nodeType="tmRoot"/>
+      </p:par>
+    </p:tnLst>
+  </p:timing>
+</p:sld>
+</file>
+
+<file path=ppt/slides/slide11.xml><?xml version="1.0" encoding="utf-8"?>
+<p:sld xmlns:a="http://schemas.openxmlformats.org/drawingml/2006/main" xmlns:r="http://schemas.openxmlformats.org/officeDocument/2006/relationships" xmlns:p="http://schemas.openxmlformats.org/presentationml/2006/main">
+  <p:cSld>
+    <p:spTree>
+      <p:nvGrpSpPr>
+        <p:cNvPr id="1" name=""/>
+        <p:cNvGrpSpPr/>
+        <p:nvPr/>
+      </p:nvGrpSpPr>
+      <p:grpSpPr>
+        <a:xfrm>
+          <a:off x="0" y="0"/>
+          <a:ext cx="0" cy="0"/>
+          <a:chOff x="0" y="0"/>
+          <a:chExt cx="0" cy="0"/>
+        </a:xfrm>
+      </p:grpSpPr>
+      <p:sp>
+        <p:nvSpPr>
+          <p:cNvPr id="2" name="Titel 1"/>
+          <p:cNvSpPr>
+            <a:spLocks noGrp="1"/>
+          </p:cNvSpPr>
+          <p:nvPr>
+            <p:ph type="title"/>
+          </p:nvPr>
+        </p:nvSpPr>
+        <p:spPr/>
+        <p:txBody>
+          <a:bodyPr/>
+          <a:lstStyle/>
+          <a:p>
+            <a:r>
+              <a:rPr lang="de-DE" dirty="0" smtClean="0"/>
+              <a:t>Wann sind </a:t>
+            </a:r>
+            <a:r>
+              <a:rPr lang="de-DE" i="1" dirty="0" err="1" smtClean="0"/>
+              <a:t>stages</a:t>
+            </a:r>
+            <a:r>
+              <a:rPr lang="de-DE" i="1" dirty="0" smtClean="0"/>
+              <a:t> </a:t>
+            </a:r>
+            <a:r>
+              <a:rPr lang="de-DE" i="1" dirty="0" err="1" smtClean="0"/>
+              <a:t>ready</a:t>
+            </a:r>
+            <a:r>
+              <a:rPr lang="de-DE" dirty="0" smtClean="0"/>
+              <a:t>?</a:t>
+            </a:r>
+            <a:endParaRPr lang="de-DE" dirty="0"/>
+          </a:p>
+        </p:txBody>
+      </p:sp>
+      <p:sp>
+        <p:nvSpPr>
+          <p:cNvPr id="3" name="Inhaltsplatzhalter 2"/>
+          <p:cNvSpPr>
+            <a:spLocks noGrp="1"/>
+          </p:cNvSpPr>
+          <p:nvPr>
+            <p:ph idx="1"/>
+          </p:nvPr>
+        </p:nvSpPr>
+        <p:spPr/>
+        <p:txBody>
+          <a:bodyPr/>
+          <a:lstStyle/>
+          <a:p>
+            <a:r>
+              <a:rPr lang="de-DE" dirty="0" smtClean="0"/>
+              <a:t>Erstes Laufband: Immer!</a:t>
+            </a:r>
+          </a:p>
+          <a:p>
+            <a:r>
+              <a:rPr lang="de-DE" dirty="0" smtClean="0"/>
+              <a:t>Schieber: Wenn sie nicht belegt und der hintere Trigger aktiv ist</a:t>
+            </a:r>
+          </a:p>
+          <a:p>
+            <a:endParaRPr lang="de-DE" dirty="0" smtClean="0"/>
+          </a:p>
+        </p:txBody>
+      </p:sp>
+      <p:sp>
+        <p:nvSpPr>
+          <p:cNvPr id="4" name="Foliennummernplatzhalter 3"/>
+          <p:cNvSpPr>
+            <a:spLocks noGrp="1"/>
+          </p:cNvSpPr>
+          <p:nvPr>
+            <p:ph type="sldNum" sz="quarter" idx="11"/>
+          </p:nvPr>
+        </p:nvSpPr>
+        <p:spPr/>
+        <p:txBody>
+          <a:bodyPr/>
+          <a:lstStyle/>
+          <a:p>
+            <a:fld id="{8F7FB5C4-64A8-4489-A065-F733EF225B1A}" type="slidenum">
+              <a:rPr lang="de-DE" smtClean="0"/>
+              <a:t>11</a:t>
+            </a:fld>
+            <a:endParaRPr lang="de-DE"/>
+          </a:p>
+        </p:txBody>
+      </p:sp>
+      <p:sp>
+        <p:nvSpPr>
+          <p:cNvPr id="5" name="Fußzeilenplatzhalter 4"/>
+          <p:cNvSpPr>
+            <a:spLocks noGrp="1"/>
+          </p:cNvSpPr>
+          <p:nvPr>
+            <p:ph type="ftr" sz="quarter" idx="3"/>
+          </p:nvPr>
+        </p:nvSpPr>
+        <p:spPr/>
+        <p:txBody>
+          <a:bodyPr/>
+          <a:lstStyle/>
+          <a:p>
+            <a:r>
+              <a:rPr lang="en-US" smtClean="0"/>
+              <a:t>Manuel Wurth, Christian Weber – 20.01.2016</a:t>
+            </a:r>
+            <a:endParaRPr lang="de-DE" dirty="0"/>
+          </a:p>
+        </p:txBody>
+      </p:sp>
+      <p:graphicFrame>
+        <p:nvGraphicFramePr>
+          <p:cNvPr id="6" name="Objekt 5"/>
+          <p:cNvGraphicFramePr>
+            <a:graphicFrameLocks noChangeAspect="1"/>
+          </p:cNvGraphicFramePr>
+          <p:nvPr>
+            <p:extLst>
+              <p:ext uri="{D42A27DB-BD31-4B8C-83A1-F6EECF244321}">
+                <p14:modId xmlns:p14="http://schemas.microsoft.com/office/powerpoint/2010/main" val="1770200694"/>
+              </p:ext>
+            </p:extLst>
+          </p:nvPr>
+        </p:nvGraphicFramePr>
+        <p:xfrm>
+          <a:off x="683568" y="3429000"/>
+          <a:ext cx="6100762" cy="4064000"/>
+        </p:xfrm>
+        <a:graphic>
+          <a:graphicData uri="http://schemas.openxmlformats.org/presentationml/2006/ole">
+            <mc:AlternateContent xmlns:mc="http://schemas.openxmlformats.org/markup-compatibility/2006">
+              <mc:Choice xmlns:v="urn:schemas-microsoft-com:vml" Requires="v">
+                <p:oleObj spid="_x0000_s2056" name="Dokument" r:id="rId3" imgW="6100084" imgH="4063581" progId="Word.Document.12">
+                  <p:embed/>
+                </p:oleObj>
+              </mc:Choice>
+              <mc:Fallback>
+                <p:oleObj name="Dokument" r:id="rId3" imgW="6100084" imgH="4063581" progId="Word.Document.12">
+                  <p:embed/>
+                  <p:pic>
+                    <p:nvPicPr>
+                      <p:cNvPr id="0" name=""/>
+                      <p:cNvPicPr/>
+                      <p:nvPr/>
+                    </p:nvPicPr>
+                    <p:blipFill>
+                      <a:blip r:embed="rId4"/>
+                      <a:stretch>
+                        <a:fillRect/>
+                      </a:stretch>
+                    </p:blipFill>
+                    <p:spPr>
+                      <a:xfrm>
+                        <a:off x="683568" y="3429000"/>
+                        <a:ext cx="6100762" cy="4064000"/>
+                      </a:xfrm>
+                      <a:prstGeom prst="rect">
+                        <a:avLst/>
+                      </a:prstGeom>
+                    </p:spPr>
+                  </p:pic>
+                </p:oleObj>
+              </mc:Fallback>
+            </mc:AlternateContent>
+          </a:graphicData>
+        </a:graphic>
+      </p:graphicFrame>
+    </p:spTree>
+    <p:extLst>
+      <p:ext uri="{BB962C8B-B14F-4D97-AF65-F5344CB8AC3E}">
+        <p14:creationId xmlns:p14="http://schemas.microsoft.com/office/powerpoint/2010/main" val="2467036991"/>
+      </p:ext>
+    </p:extLst>
+  </p:cSld>
+  <p:clrMapOvr>
+    <a:masterClrMapping/>
+  </p:clrMapOvr>
+  <p:transition spd="med"/>
+  <p:timing>
+    <p:tnLst>
+      <p:par>
+        <p:cTn id="1" dur="indefinite" restart="never" nodeType="tmRoot"/>
+      </p:par>
+    </p:tnLst>
+  </p:timing>
+</p:sld>
+</file>
+
+<file path=ppt/slides/slide12.xml><?xml version="1.0" encoding="utf-8"?>
+<p:sld xmlns:a="http://schemas.openxmlformats.org/drawingml/2006/main" xmlns:r="http://schemas.openxmlformats.org/officeDocument/2006/relationships" xmlns:p="http://schemas.openxmlformats.org/presentationml/2006/main">
+  <p:cSld>
+    <p:spTree>
+      <p:nvGrpSpPr>
+        <p:cNvPr id="1" name=""/>
+        <p:cNvGrpSpPr/>
+        <p:nvPr/>
+      </p:nvGrpSpPr>
+      <p:grpSpPr>
+        <a:xfrm>
+          <a:off x="0" y="0"/>
+          <a:ext cx="0" cy="0"/>
+          <a:chOff x="0" y="0"/>
+          <a:chExt cx="0" cy="0"/>
+        </a:xfrm>
+      </p:grpSpPr>
+      <p:sp>
+        <p:nvSpPr>
+          <p:cNvPr id="2" name="Titel 1"/>
+          <p:cNvSpPr>
+            <a:spLocks noGrp="1"/>
+          </p:cNvSpPr>
+          <p:nvPr>
+            <p:ph type="title"/>
+          </p:nvPr>
+        </p:nvSpPr>
+        <p:spPr/>
+        <p:txBody>
+          <a:bodyPr/>
+          <a:lstStyle/>
+          <a:p>
+            <a:r>
+              <a:rPr lang="de-DE" dirty="0"/>
+              <a:t>Wann sind </a:t>
+            </a:r>
+            <a:r>
+              <a:rPr lang="de-DE" i="1" dirty="0" err="1"/>
+              <a:t>stages</a:t>
+            </a:r>
+            <a:r>
+              <a:rPr lang="de-DE" i="1" dirty="0"/>
+              <a:t> </a:t>
+            </a:r>
+            <a:r>
+              <a:rPr lang="de-DE" i="1" dirty="0" err="1"/>
+              <a:t>ready</a:t>
+            </a:r>
+            <a:r>
+              <a:rPr lang="de-DE" dirty="0"/>
+              <a:t>?</a:t>
+            </a:r>
+          </a:p>
+        </p:txBody>
+      </p:sp>
+      <p:sp>
+        <p:nvSpPr>
+          <p:cNvPr id="3" name="Inhaltsplatzhalter 2"/>
+          <p:cNvSpPr>
+            <a:spLocks noGrp="1"/>
+          </p:cNvSpPr>
+          <p:nvPr>
+            <p:ph idx="1"/>
+          </p:nvPr>
+        </p:nvSpPr>
+        <p:spPr/>
+        <p:txBody>
+          <a:bodyPr/>
+          <a:lstStyle/>
+          <a:p>
+            <a:r>
+              <a:rPr lang="de-DE" dirty="0"/>
+              <a:t>Laufband 2 und 3: Wenn sich kein Werkstück vor der Lichtschranke </a:t>
+            </a:r>
+            <a:r>
+              <a:rPr lang="de-DE" dirty="0" smtClean="0"/>
+              <a:t>befindet</a:t>
+            </a:r>
+          </a:p>
+          <a:p>
+            <a:pPr marL="0" indent="0">
+              <a:buNone/>
+            </a:pPr>
+            <a:endParaRPr lang="de-DE" dirty="0"/>
+          </a:p>
+          <a:p>
+            <a:endParaRPr lang="de-DE" dirty="0"/>
+          </a:p>
+          <a:p>
+            <a:endParaRPr lang="de-DE" dirty="0" smtClean="0"/>
+          </a:p>
+          <a:p>
+            <a:r>
+              <a:rPr lang="de-DE" dirty="0"/>
+              <a:t>Laufband 4: Wenn die Lichtschranke nicht über längere Zeit blockiert ist</a:t>
+            </a:r>
+          </a:p>
+          <a:p>
+            <a:endParaRPr lang="de-DE" dirty="0"/>
+          </a:p>
+        </p:txBody>
+      </p:sp>
+      <p:sp>
+        <p:nvSpPr>
+          <p:cNvPr id="4" name="Foliennummernplatzhalter 3"/>
+          <p:cNvSpPr>
+            <a:spLocks noGrp="1"/>
+          </p:cNvSpPr>
+          <p:nvPr>
+            <p:ph type="sldNum" sz="quarter" idx="11"/>
+          </p:nvPr>
+        </p:nvSpPr>
+        <p:spPr/>
+        <p:txBody>
+          <a:bodyPr/>
+          <a:lstStyle/>
+          <a:p>
+            <a:fld id="{8F7FB5C4-64A8-4489-A065-F733EF225B1A}" type="slidenum">
+              <a:rPr lang="de-DE" smtClean="0"/>
+              <a:t>12</a:t>
+            </a:fld>
+            <a:endParaRPr lang="de-DE"/>
+          </a:p>
+        </p:txBody>
+      </p:sp>
+      <p:sp>
+        <p:nvSpPr>
+          <p:cNvPr id="5" name="Fußzeilenplatzhalter 4"/>
+          <p:cNvSpPr>
+            <a:spLocks noGrp="1"/>
+          </p:cNvSpPr>
+          <p:nvPr>
+            <p:ph type="ftr" sz="quarter" idx="3"/>
+          </p:nvPr>
+        </p:nvSpPr>
+        <p:spPr/>
+        <p:txBody>
+          <a:bodyPr/>
+          <a:lstStyle/>
+          <a:p>
+            <a:r>
+              <a:rPr lang="en-US" smtClean="0"/>
+              <a:t>Manuel Wurth, Christian Weber – 20.01.2016</a:t>
+            </a:r>
+            <a:endParaRPr lang="de-DE" dirty="0"/>
+          </a:p>
+        </p:txBody>
+      </p:sp>
+      <p:graphicFrame>
+        <p:nvGraphicFramePr>
+          <p:cNvPr id="6" name="Objekt 5"/>
+          <p:cNvGraphicFramePr>
+            <a:graphicFrameLocks noChangeAspect="1"/>
+          </p:cNvGraphicFramePr>
+          <p:nvPr>
+            <p:extLst>
+              <p:ext uri="{D42A27DB-BD31-4B8C-83A1-F6EECF244321}">
+                <p14:modId xmlns:p14="http://schemas.microsoft.com/office/powerpoint/2010/main" val="2005240856"/>
+              </p:ext>
+            </p:extLst>
+          </p:nvPr>
+        </p:nvGraphicFramePr>
+        <p:xfrm>
+          <a:off x="683568" y="2793111"/>
+          <a:ext cx="6100762" cy="4064000"/>
+        </p:xfrm>
+        <a:graphic>
+          <a:graphicData uri="http://schemas.openxmlformats.org/presentationml/2006/ole">
+            <mc:AlternateContent xmlns:mc="http://schemas.openxmlformats.org/markup-compatibility/2006">
+              <mc:Choice xmlns:v="urn:schemas-microsoft-com:vml" Requires="v">
+                <p:oleObj spid="_x0000_s3079" name="Dokument" r:id="rId3" imgW="6100084" imgH="4063581" progId="Word.Document.12">
+                  <p:embed/>
+                </p:oleObj>
+              </mc:Choice>
+              <mc:Fallback>
+                <p:oleObj name="Dokument" r:id="rId3" imgW="6100084" imgH="4063581" progId="Word.Document.12">
+                  <p:embed/>
+                  <p:pic>
+                    <p:nvPicPr>
+                      <p:cNvPr id="0" name=""/>
+                      <p:cNvPicPr/>
+                      <p:nvPr/>
+                    </p:nvPicPr>
+                    <p:blipFill>
+                      <a:blip r:embed="rId4"/>
+                      <a:stretch>
+                        <a:fillRect/>
+                      </a:stretch>
+                    </p:blipFill>
+                    <p:spPr>
+                      <a:xfrm>
+                        <a:off x="683568" y="2793111"/>
+                        <a:ext cx="6100762" cy="4064000"/>
+                      </a:xfrm>
+                      <a:prstGeom prst="rect">
+                        <a:avLst/>
+                      </a:prstGeom>
+                    </p:spPr>
+                  </p:pic>
+                </p:oleObj>
+              </mc:Fallback>
+            </mc:AlternateContent>
+          </a:graphicData>
+        </a:graphic>
+      </p:graphicFrame>
+    </p:spTree>
+    <p:extLst>
+      <p:ext uri="{BB962C8B-B14F-4D97-AF65-F5344CB8AC3E}">
+        <p14:creationId xmlns:p14="http://schemas.microsoft.com/office/powerpoint/2010/main" val="3129601604"/>
+      </p:ext>
+    </p:extLst>
+  </p:cSld>
+  <p:clrMapOvr>
+    <a:masterClrMapping/>
+  </p:clrMapOvr>
+  <p:transition spd="med"/>
+  <p:timing>
+    <p:tnLst>
+      <p:par>
+        <p:cTn id="1" dur="indefinite" restart="never" nodeType="tmRoot"/>
+      </p:par>
+    </p:tnLst>
+  </p:timing>
+</p:sld>
+</file>
+
+<file path=ppt/slides/slide13.xml><?xml version="1.0" encoding="utf-8"?>
+<p:sld xmlns:a="http://schemas.openxmlformats.org/drawingml/2006/main" xmlns:r="http://schemas.openxmlformats.org/officeDocument/2006/relationships" xmlns:p="http://schemas.openxmlformats.org/presentationml/2006/main">
+  <p:cSld>
+    <p:spTree>
+      <p:nvGrpSpPr>
+        <p:cNvPr id="1" name=""/>
+        <p:cNvGrpSpPr/>
+        <p:nvPr/>
+      </p:nvGrpSpPr>
+      <p:grpSpPr>
+        <a:xfrm>
+          <a:off x="0" y="0"/>
+          <a:ext cx="0" cy="0"/>
+          <a:chOff x="0" y="0"/>
+          <a:chExt cx="0" cy="0"/>
+        </a:xfrm>
+      </p:grpSpPr>
+      <p:sp>
+        <p:nvSpPr>
+          <p:cNvPr id="2" name="Titel 1"/>
+          <p:cNvSpPr>
+            <a:spLocks noGrp="1"/>
+          </p:cNvSpPr>
+          <p:nvPr>
+            <p:ph type="title"/>
+          </p:nvPr>
+        </p:nvSpPr>
+        <p:spPr/>
+        <p:txBody>
+          <a:bodyPr/>
+          <a:lstStyle/>
+          <a:p>
+            <a:r>
+              <a:rPr lang="de-DE" dirty="0" smtClean="0"/>
+              <a:t>Pause und Stopp</a:t>
+            </a:r>
+            <a:endParaRPr lang="de-DE" dirty="0"/>
+          </a:p>
+        </p:txBody>
+      </p:sp>
+      <p:sp>
+        <p:nvSpPr>
+          <p:cNvPr id="3" name="Textplatzhalter 2"/>
+          <p:cNvSpPr>
+            <a:spLocks noGrp="1"/>
+          </p:cNvSpPr>
+          <p:nvPr>
+            <p:ph type="body" idx="1"/>
+          </p:nvPr>
+        </p:nvSpPr>
+        <p:spPr/>
+        <p:txBody>
+          <a:bodyPr/>
+          <a:lstStyle/>
+          <a:p>
+            <a:endParaRPr lang="de-DE"/>
+          </a:p>
+        </p:txBody>
+      </p:sp>
+      <p:sp>
+        <p:nvSpPr>
+          <p:cNvPr id="4" name="Foliennummernplatzhalter 3"/>
+          <p:cNvSpPr>
+            <a:spLocks noGrp="1"/>
+          </p:cNvSpPr>
+          <p:nvPr>
+            <p:ph type="sldNum" sz="quarter" idx="11"/>
+          </p:nvPr>
+        </p:nvSpPr>
+        <p:spPr/>
+        <p:txBody>
+          <a:bodyPr/>
+          <a:lstStyle/>
+          <a:p>
+            <a:fld id="{8F7FB5C4-64A8-4489-A065-F733EF225B1A}" type="slidenum">
+              <a:rPr lang="de-DE" smtClean="0"/>
+              <a:t>13</a:t>
+            </a:fld>
+            <a:endParaRPr lang="de-DE"/>
+          </a:p>
+        </p:txBody>
+      </p:sp>
+      <p:sp>
+        <p:nvSpPr>
+          <p:cNvPr id="5" name="Fußzeilenplatzhalter 4"/>
+          <p:cNvSpPr>
+            <a:spLocks noGrp="1"/>
+          </p:cNvSpPr>
+          <p:nvPr>
+            <p:ph type="ftr" sz="quarter" idx="3"/>
+          </p:nvPr>
+        </p:nvSpPr>
+        <p:spPr/>
+        <p:txBody>
+          <a:bodyPr/>
+          <a:lstStyle/>
+          <a:p>
+            <a:r>
+              <a:rPr lang="en-US" smtClean="0"/>
+              <a:t>Manuel Wurth, Christian Weber – 20.01.2016</a:t>
+            </a:r>
+            <a:endParaRPr lang="de-DE" dirty="0"/>
+          </a:p>
+        </p:txBody>
+      </p:sp>
+    </p:spTree>
+    <p:extLst>
+      <p:ext uri="{BB962C8B-B14F-4D97-AF65-F5344CB8AC3E}">
+        <p14:creationId xmlns:p14="http://schemas.microsoft.com/office/powerpoint/2010/main" val="1276502851"/>
+      </p:ext>
+    </p:extLst>
+  </p:cSld>
+  <p:clrMapOvr>
+    <a:masterClrMapping/>
+  </p:clrMapOvr>
+  <p:transition spd="med"/>
+  <p:timing>
+    <p:tnLst>
+      <p:par>
+        <p:cTn id="1" dur="indefinite" restart="never" nodeType="tmRoot"/>
+      </p:par>
+    </p:tnLst>
+  </p:timing>
+</p:sld>
+</file>
+
+<file path=ppt/slides/slide14.xml><?xml version="1.0" encoding="utf-8"?>
+<p:sld xmlns:a="http://schemas.openxmlformats.org/drawingml/2006/main" xmlns:r="http://schemas.openxmlformats.org/officeDocument/2006/relationships" xmlns:p="http://schemas.openxmlformats.org/presentationml/2006/main">
+  <p:cSld>
+    <p:spTree>
+      <p:nvGrpSpPr>
+        <p:cNvPr id="1" name=""/>
+        <p:cNvGrpSpPr/>
+        <p:nvPr/>
+      </p:nvGrpSpPr>
+      <p:grpSpPr>
+        <a:xfrm>
+          <a:off x="0" y="0"/>
+          <a:ext cx="0" cy="0"/>
+          <a:chOff x="0" y="0"/>
+          <a:chExt cx="0" cy="0"/>
+        </a:xfrm>
+      </p:grpSpPr>
+      <p:sp>
+        <p:nvSpPr>
+          <p:cNvPr id="2" name="Titel 1"/>
+          <p:cNvSpPr>
+            <a:spLocks noGrp="1"/>
+          </p:cNvSpPr>
+          <p:nvPr>
+            <p:ph type="title"/>
+          </p:nvPr>
+        </p:nvSpPr>
+        <p:spPr/>
+        <p:txBody>
+          <a:bodyPr/>
+          <a:lstStyle/>
+          <a:p>
+            <a:r>
+              <a:rPr lang="de-DE" dirty="0" smtClean="0"/>
+              <a:t>Ort und Reihenfolge</a:t>
+            </a:r>
+            <a:endParaRPr lang="de-DE" dirty="0"/>
+          </a:p>
+        </p:txBody>
+      </p:sp>
+      <p:sp>
+        <p:nvSpPr>
+          <p:cNvPr id="3" name="Inhaltsplatzhalter 2"/>
+          <p:cNvSpPr>
+            <a:spLocks noGrp="1"/>
+          </p:cNvSpPr>
+          <p:nvPr>
+            <p:ph idx="1"/>
+          </p:nvPr>
+        </p:nvSpPr>
+        <p:spPr/>
+        <p:txBody>
+          <a:bodyPr/>
+          <a:lstStyle/>
+          <a:p>
+            <a:r>
+              <a:rPr lang="de-DE" dirty="0" smtClean="0"/>
+              <a:t>Wechsel zwischen Pause, Stopp, und Laufender Betrieb ohne Datenverlust!</a:t>
+            </a:r>
+          </a:p>
+          <a:p>
+            <a:r>
+              <a:rPr lang="de-DE" dirty="0" smtClean="0"/>
+              <a:t>Pause und Stopp benötigen Teile der Logik des Laufenden Betriebs</a:t>
+            </a:r>
+          </a:p>
+          <a:p>
+            <a:r>
+              <a:rPr lang="de-DE" dirty="0" smtClean="0"/>
+              <a:t>Deshalb sind sie Teil des Laufenden Betriebs</a:t>
+            </a:r>
+            <a:endParaRPr lang="de-DE" dirty="0"/>
+          </a:p>
+        </p:txBody>
+      </p:sp>
+      <p:sp>
+        <p:nvSpPr>
+          <p:cNvPr id="4" name="Foliennummernplatzhalter 3"/>
+          <p:cNvSpPr>
+            <a:spLocks noGrp="1"/>
+          </p:cNvSpPr>
+          <p:nvPr>
+            <p:ph type="sldNum" sz="quarter" idx="11"/>
+          </p:nvPr>
+        </p:nvSpPr>
+        <p:spPr/>
+        <p:txBody>
+          <a:bodyPr/>
+          <a:lstStyle/>
+          <a:p>
+            <a:fld id="{8F7FB5C4-64A8-4489-A065-F733EF225B1A}" type="slidenum">
+              <a:rPr lang="de-DE" smtClean="0"/>
+              <a:t>14</a:t>
+            </a:fld>
+            <a:endParaRPr lang="de-DE"/>
+          </a:p>
+        </p:txBody>
+      </p:sp>
+      <p:sp>
+        <p:nvSpPr>
+          <p:cNvPr id="5" name="Fußzeilenplatzhalter 4"/>
+          <p:cNvSpPr>
+            <a:spLocks noGrp="1"/>
+          </p:cNvSpPr>
+          <p:nvPr>
+            <p:ph type="ftr" sz="quarter" idx="3"/>
+          </p:nvPr>
+        </p:nvSpPr>
+        <p:spPr/>
+        <p:txBody>
+          <a:bodyPr/>
+          <a:lstStyle/>
+          <a:p>
+            <a:r>
+              <a:rPr lang="en-US" smtClean="0"/>
+              <a:t>Manuel Wurth, Christian Weber – 20.01.2016</a:t>
+            </a:r>
+            <a:endParaRPr lang="de-DE" dirty="0"/>
+          </a:p>
+        </p:txBody>
+      </p:sp>
+    </p:spTree>
+    <p:extLst>
+      <p:ext uri="{BB962C8B-B14F-4D97-AF65-F5344CB8AC3E}">
+        <p14:creationId xmlns:p14="http://schemas.microsoft.com/office/powerpoint/2010/main" val="1704160219"/>
+      </p:ext>
+    </p:extLst>
+  </p:cSld>
+  <p:clrMapOvr>
+    <a:masterClrMapping/>
+  </p:clrMapOvr>
+  <p:transition spd="med"/>
+  <p:timing>
+    <p:tnLst>
+      <p:par>
+        <p:cTn id="1" dur="indefinite" restart="never" nodeType="tmRoot"/>
+      </p:par>
+    </p:tnLst>
+  </p:timing>
+</p:sld>
+</file>
+
+<file path=ppt/slides/slide15.xml><?xml version="1.0" encoding="utf-8"?>
+<p:sld xmlns:a="http://schemas.openxmlformats.org/drawingml/2006/main" xmlns:r="http://schemas.openxmlformats.org/officeDocument/2006/relationships" xmlns:p="http://schemas.openxmlformats.org/presentationml/2006/main">
+  <p:cSld>
+    <p:spTree>
+      <p:nvGrpSpPr>
+        <p:cNvPr id="1" name=""/>
+        <p:cNvGrpSpPr/>
+        <p:nvPr/>
+      </p:nvGrpSpPr>
+      <p:grpSpPr>
+        <a:xfrm>
+          <a:off x="0" y="0"/>
+          <a:ext cx="0" cy="0"/>
+          <a:chOff x="0" y="0"/>
+          <a:chExt cx="0" cy="0"/>
+        </a:xfrm>
+      </p:grpSpPr>
+      <p:sp>
+        <p:nvSpPr>
+          <p:cNvPr id="2" name="Titel 1"/>
+          <p:cNvSpPr>
+            <a:spLocks noGrp="1"/>
+          </p:cNvSpPr>
+          <p:nvPr>
+            <p:ph type="title"/>
+          </p:nvPr>
+        </p:nvSpPr>
+        <p:spPr/>
+        <p:txBody>
+          <a:bodyPr/>
+          <a:lstStyle/>
+          <a:p>
+            <a:r>
+              <a:rPr lang="de-DE" dirty="0" smtClean="0"/>
+              <a:t>Ort und Reihenfolge</a:t>
+            </a:r>
+            <a:endParaRPr lang="de-DE" dirty="0"/>
+          </a:p>
+        </p:txBody>
+      </p:sp>
+      <p:sp>
+        <p:nvSpPr>
+          <p:cNvPr id="3" name="Inhaltsplatzhalter 2"/>
+          <p:cNvSpPr>
+            <a:spLocks noGrp="1"/>
+          </p:cNvSpPr>
+          <p:nvPr>
+            <p:ph idx="1"/>
+          </p:nvPr>
+        </p:nvSpPr>
+        <p:spPr/>
+        <p:txBody>
+          <a:bodyPr/>
+          <a:lstStyle/>
+          <a:p>
+            <a:r>
+              <a:rPr lang="de-DE" dirty="0" smtClean="0"/>
+              <a:t>Berechnungen für Aktoren:</a:t>
+            </a:r>
+          </a:p>
+          <a:p>
+            <a:pPr marL="0" indent="0">
+              <a:buNone/>
+            </a:pPr>
+            <a:endParaRPr lang="de-DE" dirty="0"/>
+          </a:p>
+        </p:txBody>
+      </p:sp>
+      <p:sp>
+        <p:nvSpPr>
+          <p:cNvPr id="4" name="Foliennummernplatzhalter 3"/>
+          <p:cNvSpPr>
+            <a:spLocks noGrp="1"/>
+          </p:cNvSpPr>
+          <p:nvPr>
+            <p:ph type="sldNum" sz="quarter" idx="11"/>
+          </p:nvPr>
+        </p:nvSpPr>
+        <p:spPr/>
+        <p:txBody>
+          <a:bodyPr/>
+          <a:lstStyle/>
+          <a:p>
+            <a:fld id="{8F7FB5C4-64A8-4489-A065-F733EF225B1A}" type="slidenum">
+              <a:rPr lang="de-DE" smtClean="0"/>
+              <a:t>15</a:t>
+            </a:fld>
+            <a:endParaRPr lang="de-DE"/>
+          </a:p>
+        </p:txBody>
+      </p:sp>
+      <p:sp>
+        <p:nvSpPr>
+          <p:cNvPr id="5" name="Fußzeilenplatzhalter 4"/>
+          <p:cNvSpPr>
+            <a:spLocks noGrp="1"/>
+          </p:cNvSpPr>
+          <p:nvPr>
+            <p:ph type="ftr" sz="quarter" idx="3"/>
+          </p:nvPr>
+        </p:nvSpPr>
+        <p:spPr/>
+        <p:txBody>
+          <a:bodyPr/>
+          <a:lstStyle/>
+          <a:p>
+            <a:r>
+              <a:rPr lang="en-US" smtClean="0"/>
+              <a:t>Manuel Wurth, Christian Weber – 20.01.2016</a:t>
+            </a:r>
+            <a:endParaRPr lang="de-DE" dirty="0"/>
+          </a:p>
+        </p:txBody>
+      </p:sp>
+      <p:graphicFrame>
+        <p:nvGraphicFramePr>
+          <p:cNvPr id="6" name="Objekt 5"/>
+          <p:cNvGraphicFramePr>
+            <a:graphicFrameLocks noChangeAspect="1"/>
+          </p:cNvGraphicFramePr>
+          <p:nvPr>
+            <p:extLst>
+              <p:ext uri="{D42A27DB-BD31-4B8C-83A1-F6EECF244321}">
+                <p14:modId xmlns:p14="http://schemas.microsoft.com/office/powerpoint/2010/main" val="3479605104"/>
+              </p:ext>
+            </p:extLst>
+          </p:nvPr>
+        </p:nvGraphicFramePr>
+        <p:xfrm>
+          <a:off x="683568" y="2348880"/>
+          <a:ext cx="6100762" cy="4064000"/>
+        </p:xfrm>
+        <a:graphic>
+          <a:graphicData uri="http://schemas.openxmlformats.org/presentationml/2006/ole">
+            <mc:AlternateContent xmlns:mc="http://schemas.openxmlformats.org/markup-compatibility/2006">
+              <mc:Choice xmlns:v="urn:schemas-microsoft-com:vml" Requires="v">
+                <p:oleObj spid="_x0000_s5126" name="Dokument" r:id="rId3" imgW="6100084" imgH="4063581" progId="Word.Document.12">
+                  <p:embed/>
+                </p:oleObj>
+              </mc:Choice>
+              <mc:Fallback>
+                <p:oleObj name="Dokument" r:id="rId3" imgW="6100084" imgH="4063581" progId="Word.Document.12">
+                  <p:embed/>
+                  <p:pic>
+                    <p:nvPicPr>
+                      <p:cNvPr id="0" name=""/>
+                      <p:cNvPicPr/>
+                      <p:nvPr/>
+                    </p:nvPicPr>
+                    <p:blipFill>
+                      <a:blip r:embed="rId4"/>
+                      <a:stretch>
+                        <a:fillRect/>
+                      </a:stretch>
+                    </p:blipFill>
+                    <p:spPr>
+                      <a:xfrm>
+                        <a:off x="683568" y="2348880"/>
+                        <a:ext cx="6100762" cy="4064000"/>
+                      </a:xfrm>
+                      <a:prstGeom prst="rect">
+                        <a:avLst/>
+                      </a:prstGeom>
+                    </p:spPr>
+                  </p:pic>
+                </p:oleObj>
+              </mc:Fallback>
+            </mc:AlternateContent>
+          </a:graphicData>
+        </a:graphic>
+      </p:graphicFrame>
+    </p:spTree>
+    <p:extLst>
+      <p:ext uri="{BB962C8B-B14F-4D97-AF65-F5344CB8AC3E}">
+        <p14:creationId xmlns:p14="http://schemas.microsoft.com/office/powerpoint/2010/main" val="765401676"/>
+      </p:ext>
+    </p:extLst>
+  </p:cSld>
+  <p:clrMapOvr>
+    <a:masterClrMapping/>
+  </p:clrMapOvr>
+  <p:transition spd="med"/>
+  <p:timing>
+    <p:tnLst>
+      <p:par>
+        <p:cTn id="1" dur="indefinite" restart="never" nodeType="tmRoot"/>
+      </p:par>
+    </p:tnLst>
+  </p:timing>
+</p:sld>
+</file>
+
+<file path=ppt/slides/slide16.xml><?xml version="1.0" encoding="utf-8"?>
+<p:sld xmlns:a="http://schemas.openxmlformats.org/drawingml/2006/main" xmlns:r="http://schemas.openxmlformats.org/officeDocument/2006/relationships" xmlns:p="http://schemas.openxmlformats.org/presentationml/2006/main">
+  <p:cSld>
+    <p:spTree>
+      <p:nvGrpSpPr>
+        <p:cNvPr id="1" name=""/>
+        <p:cNvGrpSpPr/>
+        <p:nvPr/>
+      </p:nvGrpSpPr>
+      <p:grpSpPr>
+        <a:xfrm>
+          <a:off x="0" y="0"/>
+          <a:ext cx="0" cy="0"/>
+          <a:chOff x="0" y="0"/>
+          <a:chExt cx="0" cy="0"/>
+        </a:xfrm>
+      </p:grpSpPr>
+      <p:sp>
+        <p:nvSpPr>
+          <p:cNvPr id="2" name="Titel 1"/>
+          <p:cNvSpPr>
+            <a:spLocks noGrp="1"/>
+          </p:cNvSpPr>
+          <p:nvPr>
+            <p:ph type="title"/>
+          </p:nvPr>
+        </p:nvSpPr>
+        <p:spPr/>
+        <p:txBody>
+          <a:bodyPr/>
+          <a:lstStyle/>
+          <a:p>
+            <a:r>
+              <a:rPr lang="de-DE" dirty="0" smtClean="0"/>
+              <a:t>Pause und Stopp</a:t>
+            </a:r>
+            <a:endParaRPr lang="de-DE" dirty="0"/>
+          </a:p>
+        </p:txBody>
+      </p:sp>
+      <p:sp>
+        <p:nvSpPr>
+          <p:cNvPr id="4" name="Foliennummernplatzhalter 3"/>
+          <p:cNvSpPr>
+            <a:spLocks noGrp="1"/>
+          </p:cNvSpPr>
+          <p:nvPr>
+            <p:ph type="sldNum" sz="quarter" idx="11"/>
+          </p:nvPr>
+        </p:nvSpPr>
+        <p:spPr/>
+        <p:txBody>
+          <a:bodyPr/>
+          <a:lstStyle/>
+          <a:p>
+            <a:fld id="{8F7FB5C4-64A8-4489-A065-F733EF225B1A}" type="slidenum">
+              <a:rPr lang="de-DE" smtClean="0"/>
+              <a:t>16</a:t>
+            </a:fld>
+            <a:endParaRPr lang="de-DE"/>
+          </a:p>
+        </p:txBody>
+      </p:sp>
+      <p:sp>
+        <p:nvSpPr>
+          <p:cNvPr id="5" name="Fußzeilenplatzhalter 4"/>
+          <p:cNvSpPr>
+            <a:spLocks noGrp="1"/>
+          </p:cNvSpPr>
+          <p:nvPr>
+            <p:ph type="ftr" sz="quarter" idx="3"/>
+          </p:nvPr>
+        </p:nvSpPr>
+        <p:spPr/>
+        <p:txBody>
+          <a:bodyPr/>
+          <a:lstStyle/>
+          <a:p>
+            <a:r>
+              <a:rPr lang="en-US" smtClean="0"/>
+              <a:t>Manuel Wurth, Christian Weber – 20.01.2016</a:t>
+            </a:r>
+            <a:endParaRPr lang="de-DE" dirty="0"/>
+          </a:p>
+        </p:txBody>
+      </p:sp>
+      <p:graphicFrame>
+        <p:nvGraphicFramePr>
+          <p:cNvPr id="6" name="Inhaltsplatzhalter 5"/>
+          <p:cNvGraphicFramePr>
+            <a:graphicFrameLocks noGrp="1" noChangeAspect="1"/>
+          </p:cNvGraphicFramePr>
+          <p:nvPr>
+            <p:ph idx="1"/>
+            <p:extLst>
+              <p:ext uri="{D42A27DB-BD31-4B8C-83A1-F6EECF244321}">
+                <p14:modId xmlns:p14="http://schemas.microsoft.com/office/powerpoint/2010/main" val="2557103402"/>
+              </p:ext>
+            </p:extLst>
+          </p:nvPr>
+        </p:nvGraphicFramePr>
+        <p:xfrm>
+          <a:off x="755650" y="1493838"/>
+          <a:ext cx="7843838" cy="4476750"/>
+        </p:xfrm>
+        <a:graphic>
+          <a:graphicData uri="http://schemas.openxmlformats.org/presentationml/2006/ole">
+            <mc:AlternateContent xmlns:mc="http://schemas.openxmlformats.org/markup-compatibility/2006">
+              <mc:Choice xmlns:v="urn:schemas-microsoft-com:vml" Requires="v">
+                <p:oleObj spid="_x0000_s4103" name="Dokument" r:id="rId3" imgW="7106915" imgH="4055302" progId="Word.Document.12">
+                  <p:embed/>
+                </p:oleObj>
+              </mc:Choice>
+              <mc:Fallback>
+                <p:oleObj name="Dokument" r:id="rId3" imgW="7106915" imgH="4055302" progId="Word.Document.12">
+                  <p:embed/>
+                  <p:pic>
+                    <p:nvPicPr>
+                      <p:cNvPr id="0" name=""/>
+                      <p:cNvPicPr/>
+                      <p:nvPr/>
+                    </p:nvPicPr>
+                    <p:blipFill>
+                      <a:blip r:embed="rId4"/>
+                      <a:stretch>
+                        <a:fillRect/>
+                      </a:stretch>
+                    </p:blipFill>
+                    <p:spPr>
+                      <a:xfrm>
+                        <a:off x="755650" y="1493838"/>
+                        <a:ext cx="7843838" cy="4476750"/>
+                      </a:xfrm>
+                      <a:prstGeom prst="rect">
+                        <a:avLst/>
+                      </a:prstGeom>
+                    </p:spPr>
+                  </p:pic>
+                </p:oleObj>
+              </mc:Fallback>
+            </mc:AlternateContent>
+          </a:graphicData>
+        </a:graphic>
+      </p:graphicFrame>
+    </p:spTree>
+    <p:extLst>
+      <p:ext uri="{BB962C8B-B14F-4D97-AF65-F5344CB8AC3E}">
+        <p14:creationId xmlns:p14="http://schemas.microsoft.com/office/powerpoint/2010/main" val="2297319458"/>
+      </p:ext>
+    </p:extLst>
+  </p:cSld>
+  <p:clrMapOvr>
+    <a:masterClrMapping/>
+  </p:clrMapOvr>
+  <p:transition spd="med"/>
+  <p:timing>
+    <p:tnLst>
+      <p:par>
+        <p:cTn id="1" dur="indefinite" restart="never" nodeType="tmRoot"/>
+      </p:par>
+    </p:tnLst>
+  </p:timing>
+</p:sld>
+</file>
+
+<file path=ppt/slides/slide17.xml><?xml version="1.0" encoding="utf-8"?>
+<p:sld xmlns:a="http://schemas.openxmlformats.org/drawingml/2006/main" xmlns:r="http://schemas.openxmlformats.org/officeDocument/2006/relationships" xmlns:p="http://schemas.openxmlformats.org/presentationml/2006/main">
+  <p:cSld>
+    <p:spTree>
+      <p:nvGrpSpPr>
+        <p:cNvPr id="1" name=""/>
+        <p:cNvGrpSpPr/>
+        <p:nvPr/>
+      </p:nvGrpSpPr>
+      <p:grpSpPr>
+        <a:xfrm>
+          <a:off x="0" y="0"/>
+          <a:ext cx="0" cy="0"/>
+          <a:chOff x="0" y="0"/>
+          <a:chExt cx="0" cy="0"/>
+        </a:xfrm>
+      </p:grpSpPr>
+      <p:sp>
+        <p:nvSpPr>
+          <p:cNvPr id="2" name="Titel 1"/>
+          <p:cNvSpPr>
+            <a:spLocks noGrp="1"/>
+          </p:cNvSpPr>
+          <p:nvPr>
+            <p:ph type="title"/>
+          </p:nvPr>
+        </p:nvSpPr>
+        <p:spPr/>
+        <p:txBody>
+          <a:bodyPr/>
+          <a:lstStyle/>
+          <a:p>
+            <a:r>
+              <a:rPr lang="de-DE" dirty="0" smtClean="0"/>
+              <a:t>Fehlerfälle</a:t>
+            </a:r>
+            <a:endParaRPr lang="de-DE" dirty="0"/>
+          </a:p>
+        </p:txBody>
+      </p:sp>
+      <p:sp>
+        <p:nvSpPr>
+          <p:cNvPr id="3" name="Textplatzhalter 2"/>
+          <p:cNvSpPr>
+            <a:spLocks noGrp="1"/>
+          </p:cNvSpPr>
+          <p:nvPr>
+            <p:ph type="body" idx="1"/>
+          </p:nvPr>
+        </p:nvSpPr>
+        <p:spPr/>
+        <p:txBody>
+          <a:bodyPr/>
+          <a:lstStyle/>
+          <a:p>
+            <a:endParaRPr lang="de-DE"/>
+          </a:p>
+        </p:txBody>
+      </p:sp>
+      <p:sp>
+        <p:nvSpPr>
+          <p:cNvPr id="4" name="Foliennummernplatzhalter 3"/>
+          <p:cNvSpPr>
+            <a:spLocks noGrp="1"/>
+          </p:cNvSpPr>
+          <p:nvPr>
+            <p:ph type="sldNum" sz="quarter" idx="11"/>
+          </p:nvPr>
+        </p:nvSpPr>
+        <p:spPr/>
+        <p:txBody>
+          <a:bodyPr/>
+          <a:lstStyle/>
+          <a:p>
+            <a:fld id="{8F7FB5C4-64A8-4489-A065-F733EF225B1A}" type="slidenum">
+              <a:rPr lang="de-DE" smtClean="0"/>
+              <a:t>17</a:t>
+            </a:fld>
+            <a:endParaRPr lang="de-DE"/>
+          </a:p>
+        </p:txBody>
+      </p:sp>
+      <p:sp>
+        <p:nvSpPr>
+          <p:cNvPr id="5" name="Fußzeilenplatzhalter 4"/>
+          <p:cNvSpPr>
+            <a:spLocks noGrp="1"/>
+          </p:cNvSpPr>
+          <p:nvPr>
+            <p:ph type="ftr" sz="quarter" idx="3"/>
+          </p:nvPr>
+        </p:nvSpPr>
+        <p:spPr/>
+        <p:txBody>
+          <a:bodyPr/>
+          <a:lstStyle/>
+          <a:p>
+            <a:r>
+              <a:rPr lang="en-US" smtClean="0"/>
+              <a:t>Manuel Wurth, Christian Weber – 20.01.2016</a:t>
+            </a:r>
+            <a:endParaRPr lang="de-DE" dirty="0"/>
+          </a:p>
+        </p:txBody>
+      </p:sp>
+    </p:spTree>
+    <p:extLst>
+      <p:ext uri="{BB962C8B-B14F-4D97-AF65-F5344CB8AC3E}">
+        <p14:creationId xmlns:p14="http://schemas.microsoft.com/office/powerpoint/2010/main" val="775892580"/>
+      </p:ext>
+    </p:extLst>
+  </p:cSld>
+  <p:clrMapOvr>
+    <a:masterClrMapping/>
+  </p:clrMapOvr>
+  <p:transition spd="med"/>
+  <p:timing>
+    <p:tnLst>
+      <p:par>
+        <p:cTn id="1" dur="indefinite" restart="never" nodeType="tmRoot"/>
+      </p:par>
+    </p:tnLst>
+  </p:timing>
+</p:sld>
+</file>
+
+<file path=ppt/slides/slide18.xml><?xml version="1.0" encoding="utf-8"?>
+<p:sld xmlns:a="http://schemas.openxmlformats.org/drawingml/2006/main" xmlns:r="http://schemas.openxmlformats.org/officeDocument/2006/relationships" xmlns:p="http://schemas.openxmlformats.org/presentationml/2006/main">
+  <p:cSld>
+    <p:spTree>
+      <p:nvGrpSpPr>
+        <p:cNvPr id="1" name=""/>
+        <p:cNvGrpSpPr/>
+        <p:nvPr/>
+      </p:nvGrpSpPr>
+      <p:grpSpPr>
+        <a:xfrm>
+          <a:off x="0" y="0"/>
+          <a:ext cx="0" cy="0"/>
+          <a:chOff x="0" y="0"/>
+          <a:chExt cx="0" cy="0"/>
+        </a:xfrm>
+      </p:grpSpPr>
+      <p:sp>
+        <p:nvSpPr>
+          <p:cNvPr id="2" name="Titel 1"/>
+          <p:cNvSpPr>
+            <a:spLocks noGrp="1"/>
+          </p:cNvSpPr>
+          <p:nvPr>
+            <p:ph type="title"/>
+          </p:nvPr>
+        </p:nvSpPr>
+        <p:spPr/>
+        <p:txBody>
+          <a:bodyPr/>
+          <a:lstStyle/>
+          <a:p>
+            <a:r>
+              <a:rPr lang="de-DE" dirty="0" smtClean="0"/>
+              <a:t>Fehlerfälle</a:t>
+            </a:r>
+            <a:endParaRPr lang="de-DE" dirty="0"/>
+          </a:p>
+        </p:txBody>
+      </p:sp>
+      <p:sp>
+        <p:nvSpPr>
+          <p:cNvPr id="3" name="Inhaltsplatzhalter 2"/>
+          <p:cNvSpPr>
+            <a:spLocks noGrp="1"/>
+          </p:cNvSpPr>
+          <p:nvPr>
+            <p:ph idx="1"/>
+          </p:nvPr>
+        </p:nvSpPr>
+        <p:spPr/>
+        <p:txBody>
+          <a:bodyPr/>
+          <a:lstStyle/>
+          <a:p>
+            <a:r>
+              <a:rPr lang="de-DE" dirty="0" smtClean="0"/>
+              <a:t>Werkstück geht verloren (</a:t>
+            </a:r>
+            <a:r>
+              <a:rPr lang="de-DE" i="1" dirty="0" err="1" smtClean="0"/>
+              <a:t>stage</a:t>
+            </a:r>
+            <a:r>
+              <a:rPr lang="de-DE" dirty="0" smtClean="0"/>
+              <a:t> 1):</a:t>
+            </a:r>
+          </a:p>
+          <a:p>
+            <a:endParaRPr lang="de-DE" dirty="0"/>
+          </a:p>
+          <a:p>
+            <a:endParaRPr lang="de-DE" dirty="0" smtClean="0"/>
+          </a:p>
+          <a:p>
+            <a:endParaRPr lang="de-DE" dirty="0"/>
+          </a:p>
+          <a:p>
+            <a:r>
+              <a:rPr lang="de-DE" dirty="0" smtClean="0"/>
+              <a:t>Hand in Lichtschranke (Lichtschranke 2)</a:t>
+            </a:r>
+          </a:p>
+        </p:txBody>
+      </p:sp>
+      <p:sp>
+        <p:nvSpPr>
+          <p:cNvPr id="4" name="Foliennummernplatzhalter 3"/>
+          <p:cNvSpPr>
+            <a:spLocks noGrp="1"/>
+          </p:cNvSpPr>
+          <p:nvPr>
+            <p:ph type="sldNum" sz="quarter" idx="11"/>
+          </p:nvPr>
+        </p:nvSpPr>
+        <p:spPr/>
+        <p:txBody>
+          <a:bodyPr/>
+          <a:lstStyle/>
+          <a:p>
+            <a:fld id="{8F7FB5C4-64A8-4489-A065-F733EF225B1A}" type="slidenum">
+              <a:rPr lang="de-DE" smtClean="0"/>
+              <a:t>18</a:t>
+            </a:fld>
+            <a:endParaRPr lang="de-DE"/>
+          </a:p>
+        </p:txBody>
+      </p:sp>
+      <p:sp>
+        <p:nvSpPr>
+          <p:cNvPr id="5" name="Fußzeilenplatzhalter 4"/>
+          <p:cNvSpPr>
+            <a:spLocks noGrp="1"/>
+          </p:cNvSpPr>
+          <p:nvPr>
+            <p:ph type="ftr" sz="quarter" idx="3"/>
+          </p:nvPr>
+        </p:nvSpPr>
+        <p:spPr/>
+        <p:txBody>
+          <a:bodyPr/>
+          <a:lstStyle/>
+          <a:p>
+            <a:r>
+              <a:rPr lang="en-US" smtClean="0"/>
+              <a:t>Manuel Wurth, Christian Weber – 20.01.2016</a:t>
+            </a:r>
+            <a:endParaRPr lang="de-DE" dirty="0"/>
+          </a:p>
+        </p:txBody>
+      </p:sp>
+      <p:graphicFrame>
+        <p:nvGraphicFramePr>
+          <p:cNvPr id="6" name="Objekt 5"/>
+          <p:cNvGraphicFramePr>
+            <a:graphicFrameLocks noChangeAspect="1"/>
+          </p:cNvGraphicFramePr>
+          <p:nvPr>
+            <p:extLst>
+              <p:ext uri="{D42A27DB-BD31-4B8C-83A1-F6EECF244321}">
+                <p14:modId xmlns:p14="http://schemas.microsoft.com/office/powerpoint/2010/main" val="861662934"/>
+              </p:ext>
+            </p:extLst>
+          </p:nvPr>
+        </p:nvGraphicFramePr>
+        <p:xfrm>
+          <a:off x="467544" y="2276872"/>
+          <a:ext cx="6100762" cy="4064000"/>
+        </p:xfrm>
+        <a:graphic>
+          <a:graphicData uri="http://schemas.openxmlformats.org/presentationml/2006/ole">
+            <mc:AlternateContent xmlns:mc="http://schemas.openxmlformats.org/markup-compatibility/2006">
+              <mc:Choice xmlns:v="urn:schemas-microsoft-com:vml" Requires="v">
+                <p:oleObj spid="_x0000_s6152" name="Dokument" r:id="rId3" imgW="6100084" imgH="4063581" progId="Word.Document.12">
+                  <p:embed/>
+                </p:oleObj>
+              </mc:Choice>
+              <mc:Fallback>
+                <p:oleObj name="Dokument" r:id="rId3" imgW="6100084" imgH="4063581" progId="Word.Document.12">
+                  <p:embed/>
+                  <p:pic>
+                    <p:nvPicPr>
+                      <p:cNvPr id="0" name=""/>
+                      <p:cNvPicPr/>
+                      <p:nvPr/>
+                    </p:nvPicPr>
+                    <p:blipFill>
+                      <a:blip r:embed="rId4"/>
+                      <a:stretch>
+                        <a:fillRect/>
+                      </a:stretch>
+                    </p:blipFill>
+                    <p:spPr>
+                      <a:xfrm>
+                        <a:off x="467544" y="2276872"/>
+                        <a:ext cx="6100762" cy="4064000"/>
+                      </a:xfrm>
+                      <a:prstGeom prst="rect">
+                        <a:avLst/>
+                      </a:prstGeom>
+                    </p:spPr>
+                  </p:pic>
+                </p:oleObj>
+              </mc:Fallback>
+            </mc:AlternateContent>
+          </a:graphicData>
+        </a:graphic>
+      </p:graphicFrame>
+      <p:graphicFrame>
+        <p:nvGraphicFramePr>
+          <p:cNvPr id="8" name="Objekt 7"/>
+          <p:cNvGraphicFramePr>
+            <a:graphicFrameLocks noChangeAspect="1"/>
+          </p:cNvGraphicFramePr>
+          <p:nvPr>
+            <p:extLst>
+              <p:ext uri="{D42A27DB-BD31-4B8C-83A1-F6EECF244321}">
+                <p14:modId xmlns:p14="http://schemas.microsoft.com/office/powerpoint/2010/main" val="3366841640"/>
+              </p:ext>
+            </p:extLst>
+          </p:nvPr>
+        </p:nvGraphicFramePr>
+        <p:xfrm>
+          <a:off x="467544" y="4653136"/>
+          <a:ext cx="9082087" cy="4056062"/>
+        </p:xfrm>
+        <a:graphic>
+          <a:graphicData uri="http://schemas.openxmlformats.org/presentationml/2006/ole">
+            <mc:AlternateContent xmlns:mc="http://schemas.openxmlformats.org/markup-compatibility/2006">
+              <mc:Choice xmlns:v="urn:schemas-microsoft-com:vml" Requires="v">
+                <p:oleObj spid="_x0000_s6153" name="Dokument" r:id="rId5" imgW="9081298" imgH="4056021" progId="Word.Document.12">
+                  <p:embed/>
+                </p:oleObj>
+              </mc:Choice>
+              <mc:Fallback>
+                <p:oleObj name="Dokument" r:id="rId5" imgW="9081298" imgH="4056021" progId="Word.Document.12">
+                  <p:embed/>
+                  <p:pic>
+                    <p:nvPicPr>
+                      <p:cNvPr id="0" name=""/>
+                      <p:cNvPicPr/>
+                      <p:nvPr/>
+                    </p:nvPicPr>
+                    <p:blipFill>
+                      <a:blip r:embed="rId6"/>
+                      <a:stretch>
+                        <a:fillRect/>
+                      </a:stretch>
+                    </p:blipFill>
+                    <p:spPr>
+                      <a:xfrm>
+                        <a:off x="467544" y="4653136"/>
+                        <a:ext cx="9082087" cy="4056062"/>
+                      </a:xfrm>
+                      <a:prstGeom prst="rect">
+                        <a:avLst/>
+                      </a:prstGeom>
+                    </p:spPr>
+                  </p:pic>
+                </p:oleObj>
+              </mc:Fallback>
+            </mc:AlternateContent>
+          </a:graphicData>
+        </a:graphic>
+      </p:graphicFrame>
+    </p:spTree>
+    <p:extLst>
+      <p:ext uri="{BB962C8B-B14F-4D97-AF65-F5344CB8AC3E}">
+        <p14:creationId xmlns:p14="http://schemas.microsoft.com/office/powerpoint/2010/main" val="3830390382"/>
+      </p:ext>
+    </p:extLst>
+  </p:cSld>
+  <p:clrMapOvr>
+    <a:masterClrMapping/>
+  </p:clrMapOvr>
+  <p:transition spd="med"/>
   <p:timing>
     <p:tnLst>
       <p:par>
@@ -5234,11 +6981,26 @@
           <a:bodyPr/>
           <a:lstStyle/>
           <a:p>
-            <a:r>
-              <a:rPr lang="de-DE" dirty="0" smtClean="0"/>
-              <a:t>Normalbetrieb</a:t>
-            </a:r>
-            <a:endParaRPr lang="de-DE" dirty="0"/>
+            <a:endParaRPr lang="de-DE"/>
+          </a:p>
+        </p:txBody>
+      </p:sp>
+      <p:sp>
+        <p:nvSpPr>
+          <p:cNvPr id="3" name="Inhaltsplatzhalter 2"/>
+          <p:cNvSpPr>
+            <a:spLocks noGrp="1"/>
+          </p:cNvSpPr>
+          <p:nvPr>
+            <p:ph idx="1"/>
+          </p:nvPr>
+        </p:nvSpPr>
+        <p:spPr/>
+        <p:txBody>
+          <a:bodyPr/>
+          <a:lstStyle/>
+          <a:p>
+            <a:endParaRPr lang="de-DE"/>
           </a:p>
         </p:txBody>
       </p:sp>
@@ -5288,6 +7050,232 @@
           </a:p>
         </p:txBody>
       </p:sp>
+    </p:spTree>
+    <p:extLst>
+      <p:ext uri="{BB962C8B-B14F-4D97-AF65-F5344CB8AC3E}">
+        <p14:creationId xmlns:p14="http://schemas.microsoft.com/office/powerpoint/2010/main" val="784556545"/>
+      </p:ext>
+    </p:extLst>
+  </p:cSld>
+  <p:clrMapOvr>
+    <a:masterClrMapping/>
+  </p:clrMapOvr>
+  <p:transition spd="med"/>
+</p:sld>
+</file>
+
+<file path=ppt/slides/slide4.xml><?xml version="1.0" encoding="utf-8"?>
+<p:sld xmlns:a="http://schemas.openxmlformats.org/drawingml/2006/main" xmlns:r="http://schemas.openxmlformats.org/officeDocument/2006/relationships" xmlns:p="http://schemas.openxmlformats.org/presentationml/2006/main">
+  <p:cSld>
+    <p:spTree>
+      <p:nvGrpSpPr>
+        <p:cNvPr id="1" name=""/>
+        <p:cNvGrpSpPr/>
+        <p:nvPr/>
+      </p:nvGrpSpPr>
+      <p:grpSpPr>
+        <a:xfrm>
+          <a:off x="0" y="0"/>
+          <a:ext cx="0" cy="0"/>
+          <a:chOff x="0" y="0"/>
+          <a:chExt cx="0" cy="0"/>
+        </a:xfrm>
+      </p:grpSpPr>
+      <p:sp>
+        <p:nvSpPr>
+          <p:cNvPr id="2" name="Titel 1"/>
+          <p:cNvSpPr>
+            <a:spLocks noGrp="1"/>
+          </p:cNvSpPr>
+          <p:nvPr>
+            <p:ph type="title"/>
+          </p:nvPr>
+        </p:nvSpPr>
+        <p:spPr/>
+        <p:txBody>
+          <a:bodyPr/>
+          <a:lstStyle/>
+          <a:p>
+            <a:r>
+              <a:rPr lang="de-DE" dirty="0" smtClean="0"/>
+              <a:t>Normalbetrieb</a:t>
+            </a:r>
+            <a:endParaRPr lang="de-DE" dirty="0"/>
+          </a:p>
+        </p:txBody>
+      </p:sp>
+      <p:sp>
+        <p:nvSpPr>
+          <p:cNvPr id="3" name="Textplatzhalter 2"/>
+          <p:cNvSpPr>
+            <a:spLocks noGrp="1"/>
+          </p:cNvSpPr>
+          <p:nvPr>
+            <p:ph type="body" idx="1"/>
+          </p:nvPr>
+        </p:nvSpPr>
+        <p:spPr/>
+        <p:txBody>
+          <a:bodyPr/>
+          <a:lstStyle/>
+          <a:p>
+            <a:endParaRPr lang="de-DE" dirty="0"/>
+          </a:p>
+        </p:txBody>
+      </p:sp>
+      <p:sp>
+        <p:nvSpPr>
+          <p:cNvPr id="4" name="Foliennummernplatzhalter 3"/>
+          <p:cNvSpPr>
+            <a:spLocks noGrp="1"/>
+          </p:cNvSpPr>
+          <p:nvPr>
+            <p:ph type="sldNum" sz="quarter" idx="11"/>
+          </p:nvPr>
+        </p:nvSpPr>
+        <p:spPr/>
+        <p:txBody>
+          <a:bodyPr/>
+          <a:lstStyle/>
+          <a:p>
+            <a:fld id="{8F7FB5C4-64A8-4489-A065-F733EF225B1A}" type="slidenum">
+              <a:rPr lang="de-DE" smtClean="0"/>
+              <a:t>4</a:t>
+            </a:fld>
+            <a:endParaRPr lang="de-DE"/>
+          </a:p>
+        </p:txBody>
+      </p:sp>
+      <p:sp>
+        <p:nvSpPr>
+          <p:cNvPr id="5" name="Fußzeilenplatzhalter 4"/>
+          <p:cNvSpPr>
+            <a:spLocks noGrp="1"/>
+          </p:cNvSpPr>
+          <p:nvPr>
+            <p:ph type="ftr" sz="quarter" idx="3"/>
+          </p:nvPr>
+        </p:nvSpPr>
+        <p:spPr/>
+        <p:txBody>
+          <a:bodyPr/>
+          <a:lstStyle/>
+          <a:p>
+            <a:r>
+              <a:rPr lang="en-US" smtClean="0"/>
+              <a:t>Manuel Wurth, Christian Weber – 20.01.2016</a:t>
+            </a:r>
+            <a:endParaRPr lang="de-DE" dirty="0"/>
+          </a:p>
+        </p:txBody>
+      </p:sp>
+    </p:spTree>
+    <p:extLst>
+      <p:ext uri="{BB962C8B-B14F-4D97-AF65-F5344CB8AC3E}">
+        <p14:creationId xmlns:p14="http://schemas.microsoft.com/office/powerpoint/2010/main" val="437657504"/>
+      </p:ext>
+    </p:extLst>
+  </p:cSld>
+  <p:clrMapOvr>
+    <a:masterClrMapping/>
+  </p:clrMapOvr>
+  <p:transition spd="med"/>
+  <p:timing>
+    <p:tnLst>
+      <p:par>
+        <p:cTn id="1" dur="indefinite" restart="never" nodeType="tmRoot"/>
+      </p:par>
+    </p:tnLst>
+  </p:timing>
+</p:sld>
+</file>
+
+<file path=ppt/slides/slide5.xml><?xml version="1.0" encoding="utf-8"?>
+<p:sld xmlns:a="http://schemas.openxmlformats.org/drawingml/2006/main" xmlns:r="http://schemas.openxmlformats.org/officeDocument/2006/relationships" xmlns:p="http://schemas.openxmlformats.org/presentationml/2006/main">
+  <p:cSld>
+    <p:spTree>
+      <p:nvGrpSpPr>
+        <p:cNvPr id="1" name=""/>
+        <p:cNvGrpSpPr/>
+        <p:nvPr/>
+      </p:nvGrpSpPr>
+      <p:grpSpPr>
+        <a:xfrm>
+          <a:off x="0" y="0"/>
+          <a:ext cx="0" cy="0"/>
+          <a:chOff x="0" y="0"/>
+          <a:chExt cx="0" cy="0"/>
+        </a:xfrm>
+      </p:grpSpPr>
+      <p:sp>
+        <p:nvSpPr>
+          <p:cNvPr id="2" name="Titel 1"/>
+          <p:cNvSpPr>
+            <a:spLocks noGrp="1"/>
+          </p:cNvSpPr>
+          <p:nvPr>
+            <p:ph type="title"/>
+          </p:nvPr>
+        </p:nvSpPr>
+        <p:spPr/>
+        <p:txBody>
+          <a:bodyPr/>
+          <a:lstStyle/>
+          <a:p>
+            <a:r>
+              <a:rPr lang="de-DE" dirty="0" smtClean="0"/>
+              <a:t>Stages</a:t>
+            </a:r>
+            <a:endParaRPr lang="de-DE" dirty="0"/>
+          </a:p>
+        </p:txBody>
+      </p:sp>
+      <p:sp>
+        <p:nvSpPr>
+          <p:cNvPr id="4" name="Foliennummernplatzhalter 3"/>
+          <p:cNvSpPr>
+            <a:spLocks noGrp="1"/>
+          </p:cNvSpPr>
+          <p:nvPr>
+            <p:ph type="sldNum" sz="quarter" idx="11"/>
+          </p:nvPr>
+        </p:nvSpPr>
+        <p:spPr/>
+        <p:txBody>
+          <a:bodyPr/>
+          <a:lstStyle/>
+          <a:p>
+            <a:fld id="{8F7FB5C4-64A8-4489-A065-F733EF225B1A}" type="slidenum">
+              <a:rPr lang="de-DE" smtClean="0"/>
+              <a:t>5</a:t>
+            </a:fld>
+            <a:endParaRPr lang="de-DE"/>
+          </a:p>
+        </p:txBody>
+      </p:sp>
+      <p:sp>
+        <p:nvSpPr>
+          <p:cNvPr id="5" name="Fußzeilenplatzhalter 4"/>
+          <p:cNvSpPr>
+            <a:spLocks noGrp="1"/>
+          </p:cNvSpPr>
+          <p:nvPr>
+            <p:ph type="ftr" sz="quarter" idx="3"/>
+          </p:nvPr>
+        </p:nvSpPr>
+        <p:spPr/>
+        <p:txBody>
+          <a:bodyPr/>
+          <a:lstStyle/>
+          <a:p>
+            <a:r>
+              <a:rPr lang="en-US" smtClean="0"/>
+              <a:t>Manuel Wurth, Christian Weber – 20.01.2016</a:t>
+            </a:r>
+            <a:endParaRPr lang="de-DE" dirty="0"/>
+          </a:p>
+        </p:txBody>
+      </p:sp>
       <p:sp>
         <p:nvSpPr>
           <p:cNvPr id="9" name="Inhaltsplatzhalter 8"/>
@@ -5303,14 +7291,688 @@
           <a:bodyPr/>
           <a:lstStyle/>
           <a:p>
+            <a:r>
+              <a:rPr lang="de-DE" i="1" dirty="0" err="1" smtClean="0"/>
+              <a:t>Structs</a:t>
+            </a:r>
+            <a:r>
+              <a:rPr lang="de-DE" dirty="0" smtClean="0"/>
+              <a:t> für jede </a:t>
+            </a:r>
+            <a:r>
+              <a:rPr lang="de-DE" i="1" dirty="0" err="1" smtClean="0"/>
+              <a:t>stage</a:t>
+            </a:r>
+            <a:endParaRPr lang="de-DE" i="1" dirty="0" smtClean="0"/>
+          </a:p>
+          <a:p>
+            <a:endParaRPr lang="de-DE" i="1" dirty="0"/>
+          </a:p>
+          <a:p>
+            <a:endParaRPr lang="de-DE" i="1" dirty="0" smtClean="0"/>
+          </a:p>
+          <a:p>
+            <a:endParaRPr lang="de-DE" i="1" dirty="0"/>
+          </a:p>
+          <a:p>
+            <a:r>
+              <a:rPr lang="de-DE" dirty="0" smtClean="0"/>
+              <a:t>6 </a:t>
+            </a:r>
+            <a:r>
+              <a:rPr lang="de-DE" dirty="0" err="1" smtClean="0"/>
+              <a:t>stages</a:t>
+            </a:r>
             <a:endParaRPr lang="de-DE" dirty="0"/>
           </a:p>
-        </p:txBody>
-      </p:sp>
+          <a:p>
+            <a:pPr lvl="1"/>
+            <a:r>
+              <a:rPr lang="de-DE" dirty="0" smtClean="0"/>
+              <a:t>4 Laufbänder (inclusive Aktoren)</a:t>
+            </a:r>
+          </a:p>
+          <a:p>
+            <a:pPr lvl="1"/>
+            <a:r>
+              <a:rPr lang="de-DE" dirty="0" smtClean="0"/>
+              <a:t>2 Schieber</a:t>
+            </a:r>
+          </a:p>
+          <a:p>
+            <a:pPr marL="0" indent="0">
+              <a:buNone/>
+            </a:pPr>
+            <a:endParaRPr lang="de-DE" i="1" dirty="0"/>
+          </a:p>
+        </p:txBody>
+      </p:sp>
+      <p:graphicFrame>
+        <p:nvGraphicFramePr>
+          <p:cNvPr id="3" name="Objekt 2"/>
+          <p:cNvGraphicFramePr>
+            <a:graphicFrameLocks noChangeAspect="1"/>
+          </p:cNvGraphicFramePr>
+          <p:nvPr>
+            <p:extLst>
+              <p:ext uri="{D42A27DB-BD31-4B8C-83A1-F6EECF244321}">
+                <p14:modId xmlns:p14="http://schemas.microsoft.com/office/powerpoint/2010/main" val="3271826374"/>
+              </p:ext>
+            </p:extLst>
+          </p:nvPr>
+        </p:nvGraphicFramePr>
+        <p:xfrm>
+          <a:off x="683568" y="2276872"/>
+          <a:ext cx="6067425" cy="4043362"/>
+        </p:xfrm>
+        <a:graphic>
+          <a:graphicData uri="http://schemas.openxmlformats.org/presentationml/2006/ole">
+            <mc:AlternateContent xmlns:mc="http://schemas.openxmlformats.org/markup-compatibility/2006">
+              <mc:Choice xmlns:v="urn:schemas-microsoft-com:vml" Requires="v">
+                <p:oleObj spid="_x0000_s1033" name="Dokument" r:id="rId3" imgW="6100084" imgH="4063581" progId="Word.Document.12">
+                  <p:embed/>
+                </p:oleObj>
+              </mc:Choice>
+              <mc:Fallback>
+                <p:oleObj name="Dokument" r:id="rId3" imgW="6100084" imgH="4063581" progId="Word.Document.12">
+                  <p:embed/>
+                  <p:pic>
+                    <p:nvPicPr>
+                      <p:cNvPr id="0" name=""/>
+                      <p:cNvPicPr/>
+                      <p:nvPr/>
+                    </p:nvPicPr>
+                    <p:blipFill>
+                      <a:blip r:embed="rId4"/>
+                      <a:stretch>
+                        <a:fillRect/>
+                      </a:stretch>
+                    </p:blipFill>
+                    <p:spPr>
+                      <a:xfrm>
+                        <a:off x="683568" y="2276872"/>
+                        <a:ext cx="6067425" cy="4043362"/>
+                      </a:xfrm>
+                      <a:prstGeom prst="rect">
+                        <a:avLst/>
+                      </a:prstGeom>
+                    </p:spPr>
+                  </p:pic>
+                </p:oleObj>
+              </mc:Fallback>
+            </mc:AlternateContent>
+          </a:graphicData>
+        </a:graphic>
+      </p:graphicFrame>
     </p:spTree>
     <p:extLst>
       <p:ext uri="{BB962C8B-B14F-4D97-AF65-F5344CB8AC3E}">
         <p14:creationId xmlns:p14="http://schemas.microsoft.com/office/powerpoint/2010/main" val="3632034651"/>
+      </p:ext>
+    </p:extLst>
+  </p:cSld>
+  <p:clrMapOvr>
+    <a:masterClrMapping/>
+  </p:clrMapOvr>
+  <p:transition spd="med"/>
+  <p:timing>
+    <p:tnLst>
+      <p:par>
+        <p:cTn id="1" dur="indefinite" restart="never" nodeType="tmRoot"/>
+      </p:par>
+    </p:tnLst>
+  </p:timing>
+</p:sld>
+</file>
+
+<file path=ppt/slides/slide6.xml><?xml version="1.0" encoding="utf-8"?>
+<p:sld xmlns:a="http://schemas.openxmlformats.org/drawingml/2006/main" xmlns:r="http://schemas.openxmlformats.org/officeDocument/2006/relationships" xmlns:p="http://schemas.openxmlformats.org/presentationml/2006/main">
+  <p:cSld>
+    <p:spTree>
+      <p:nvGrpSpPr>
+        <p:cNvPr id="1" name=""/>
+        <p:cNvGrpSpPr/>
+        <p:nvPr/>
+      </p:nvGrpSpPr>
+      <p:grpSpPr>
+        <a:xfrm>
+          <a:off x="0" y="0"/>
+          <a:ext cx="0" cy="0"/>
+          <a:chOff x="0" y="0"/>
+          <a:chExt cx="0" cy="0"/>
+        </a:xfrm>
+      </p:grpSpPr>
+      <p:sp>
+        <p:nvSpPr>
+          <p:cNvPr id="2" name="Titel 1"/>
+          <p:cNvSpPr>
+            <a:spLocks noGrp="1"/>
+          </p:cNvSpPr>
+          <p:nvPr>
+            <p:ph type="title"/>
+          </p:nvPr>
+        </p:nvSpPr>
+        <p:spPr/>
+        <p:txBody>
+          <a:bodyPr/>
+          <a:lstStyle/>
+          <a:p>
+            <a:r>
+              <a:rPr lang="de-DE" dirty="0" smtClean="0"/>
+              <a:t>Ablauf</a:t>
+            </a:r>
+            <a:endParaRPr lang="de-DE" dirty="0"/>
+          </a:p>
+        </p:txBody>
+      </p:sp>
+      <p:sp>
+        <p:nvSpPr>
+          <p:cNvPr id="3" name="Inhaltsplatzhalter 2"/>
+          <p:cNvSpPr>
+            <a:spLocks noGrp="1"/>
+          </p:cNvSpPr>
+          <p:nvPr>
+            <p:ph idx="1"/>
+          </p:nvPr>
+        </p:nvSpPr>
+        <p:spPr/>
+        <p:txBody>
+          <a:bodyPr/>
+          <a:lstStyle/>
+          <a:p>
+            <a:pPr marL="514350" indent="-514350">
+              <a:buFont typeface="+mj-lt"/>
+              <a:buAutoNum type="arabicPeriod"/>
+            </a:pPr>
+            <a:r>
+              <a:rPr lang="de-DE" dirty="0" smtClean="0"/>
+              <a:t>Sensoren lesen</a:t>
+            </a:r>
+          </a:p>
+          <a:p>
+            <a:pPr marL="514350" indent="-514350">
+              <a:buFont typeface="+mj-lt"/>
+              <a:buAutoNum type="arabicPeriod"/>
+            </a:pPr>
+            <a:r>
+              <a:rPr lang="de-DE" dirty="0" smtClean="0"/>
+              <a:t>Berechnungen für Aktoren</a:t>
+            </a:r>
+          </a:p>
+          <a:p>
+            <a:pPr marL="514350" indent="-514350">
+              <a:buFont typeface="+mj-lt"/>
+              <a:buAutoNum type="arabicPeriod"/>
+            </a:pPr>
+            <a:r>
+              <a:rPr lang="de-DE" dirty="0" smtClean="0"/>
+              <a:t>Aktoren steuern</a:t>
+            </a:r>
+            <a:endParaRPr lang="de-DE" dirty="0"/>
+          </a:p>
+        </p:txBody>
+      </p:sp>
+      <p:sp>
+        <p:nvSpPr>
+          <p:cNvPr id="4" name="Foliennummernplatzhalter 3"/>
+          <p:cNvSpPr>
+            <a:spLocks noGrp="1"/>
+          </p:cNvSpPr>
+          <p:nvPr>
+            <p:ph type="sldNum" sz="quarter" idx="11"/>
+          </p:nvPr>
+        </p:nvSpPr>
+        <p:spPr/>
+        <p:txBody>
+          <a:bodyPr/>
+          <a:lstStyle/>
+          <a:p>
+            <a:fld id="{8F7FB5C4-64A8-4489-A065-F733EF225B1A}" type="slidenum">
+              <a:rPr lang="de-DE" smtClean="0"/>
+              <a:t>6</a:t>
+            </a:fld>
+            <a:endParaRPr lang="de-DE"/>
+          </a:p>
+        </p:txBody>
+      </p:sp>
+      <p:sp>
+        <p:nvSpPr>
+          <p:cNvPr id="5" name="Fußzeilenplatzhalter 4"/>
+          <p:cNvSpPr>
+            <a:spLocks noGrp="1"/>
+          </p:cNvSpPr>
+          <p:nvPr>
+            <p:ph type="ftr" sz="quarter" idx="3"/>
+          </p:nvPr>
+        </p:nvSpPr>
+        <p:spPr/>
+        <p:txBody>
+          <a:bodyPr/>
+          <a:lstStyle/>
+          <a:p>
+            <a:r>
+              <a:rPr lang="en-US" smtClean="0"/>
+              <a:t>Manuel Wurth, Christian Weber – 20.01.2016</a:t>
+            </a:r>
+            <a:endParaRPr lang="de-DE" dirty="0"/>
+          </a:p>
+        </p:txBody>
+      </p:sp>
+    </p:spTree>
+    <p:extLst>
+      <p:ext uri="{BB962C8B-B14F-4D97-AF65-F5344CB8AC3E}">
+        <p14:creationId xmlns:p14="http://schemas.microsoft.com/office/powerpoint/2010/main" val="1312022897"/>
+      </p:ext>
+    </p:extLst>
+  </p:cSld>
+  <p:clrMapOvr>
+    <a:masterClrMapping/>
+  </p:clrMapOvr>
+  <p:transition spd="med"/>
+  <p:timing>
+    <p:tnLst>
+      <p:par>
+        <p:cTn id="1" dur="indefinite" restart="never" nodeType="tmRoot"/>
+      </p:par>
+    </p:tnLst>
+  </p:timing>
+</p:sld>
+</file>
+
+<file path=ppt/slides/slide7.xml><?xml version="1.0" encoding="utf-8"?>
+<p:sld xmlns:a="http://schemas.openxmlformats.org/drawingml/2006/main" xmlns:r="http://schemas.openxmlformats.org/officeDocument/2006/relationships" xmlns:p="http://schemas.openxmlformats.org/presentationml/2006/main">
+  <p:cSld>
+    <p:spTree>
+      <p:nvGrpSpPr>
+        <p:cNvPr id="1" name=""/>
+        <p:cNvGrpSpPr/>
+        <p:nvPr/>
+      </p:nvGrpSpPr>
+      <p:grpSpPr>
+        <a:xfrm>
+          <a:off x="0" y="0"/>
+          <a:ext cx="0" cy="0"/>
+          <a:chOff x="0" y="0"/>
+          <a:chExt cx="0" cy="0"/>
+        </a:xfrm>
+      </p:grpSpPr>
+      <p:sp>
+        <p:nvSpPr>
+          <p:cNvPr id="2" name="Titel 1"/>
+          <p:cNvSpPr>
+            <a:spLocks noGrp="1"/>
+          </p:cNvSpPr>
+          <p:nvPr>
+            <p:ph type="title"/>
+          </p:nvPr>
+        </p:nvSpPr>
+        <p:spPr/>
+        <p:txBody>
+          <a:bodyPr/>
+          <a:lstStyle/>
+          <a:p>
+            <a:r>
+              <a:rPr lang="de-DE" dirty="0" smtClean="0"/>
+              <a:t>Wann wird übergeben?</a:t>
+            </a:r>
+            <a:endParaRPr lang="de-DE" dirty="0"/>
+          </a:p>
+        </p:txBody>
+      </p:sp>
+      <p:sp>
+        <p:nvSpPr>
+          <p:cNvPr id="3" name="Inhaltsplatzhalter 2"/>
+          <p:cNvSpPr>
+            <a:spLocks noGrp="1"/>
+          </p:cNvSpPr>
+          <p:nvPr>
+            <p:ph idx="1"/>
+          </p:nvPr>
+        </p:nvSpPr>
+        <p:spPr/>
+        <p:txBody>
+          <a:bodyPr/>
+          <a:lstStyle/>
+          <a:p>
+            <a:r>
+              <a:rPr lang="de-DE" dirty="0" smtClean="0"/>
+              <a:t>Problem: Übergabe von Schieber zu Laufband klappt nicht immer einwandfrei</a:t>
+            </a:r>
+          </a:p>
+          <a:p>
+            <a:r>
+              <a:rPr lang="de-DE" dirty="0" smtClean="0"/>
+              <a:t>Lösung: Laufband laufen lassen, wenn das Werkstück übergeben wird</a:t>
+            </a:r>
+          </a:p>
+          <a:p>
+            <a:r>
+              <a:rPr lang="de-DE" dirty="0" smtClean="0"/>
+              <a:t>Problem: Das schafft größere Abhängigkeiten!</a:t>
+            </a:r>
+          </a:p>
+        </p:txBody>
+      </p:sp>
+      <p:sp>
+        <p:nvSpPr>
+          <p:cNvPr id="4" name="Foliennummernplatzhalter 3"/>
+          <p:cNvSpPr>
+            <a:spLocks noGrp="1"/>
+          </p:cNvSpPr>
+          <p:nvPr>
+            <p:ph type="sldNum" sz="quarter" idx="11"/>
+          </p:nvPr>
+        </p:nvSpPr>
+        <p:spPr/>
+        <p:txBody>
+          <a:bodyPr/>
+          <a:lstStyle/>
+          <a:p>
+            <a:fld id="{8F7FB5C4-64A8-4489-A065-F733EF225B1A}" type="slidenum">
+              <a:rPr lang="de-DE" smtClean="0"/>
+              <a:t>7</a:t>
+            </a:fld>
+            <a:endParaRPr lang="de-DE"/>
+          </a:p>
+        </p:txBody>
+      </p:sp>
+      <p:sp>
+        <p:nvSpPr>
+          <p:cNvPr id="5" name="Fußzeilenplatzhalter 4"/>
+          <p:cNvSpPr>
+            <a:spLocks noGrp="1"/>
+          </p:cNvSpPr>
+          <p:nvPr>
+            <p:ph type="ftr" sz="quarter" idx="3"/>
+          </p:nvPr>
+        </p:nvSpPr>
+        <p:spPr/>
+        <p:txBody>
+          <a:bodyPr/>
+          <a:lstStyle/>
+          <a:p>
+            <a:r>
+              <a:rPr lang="en-US" smtClean="0"/>
+              <a:t>Manuel Wurth, Christian Weber – 20.01.2016</a:t>
+            </a:r>
+            <a:endParaRPr lang="de-DE" dirty="0"/>
+          </a:p>
+        </p:txBody>
+      </p:sp>
+    </p:spTree>
+    <p:extLst>
+      <p:ext uri="{BB962C8B-B14F-4D97-AF65-F5344CB8AC3E}">
+        <p14:creationId xmlns:p14="http://schemas.microsoft.com/office/powerpoint/2010/main" val="1878555896"/>
+      </p:ext>
+    </p:extLst>
+  </p:cSld>
+  <p:clrMapOvr>
+    <a:masterClrMapping/>
+  </p:clrMapOvr>
+  <p:transition spd="med"/>
+  <p:timing>
+    <p:tnLst>
+      <p:par>
+        <p:cTn id="1" dur="indefinite" restart="never" nodeType="tmRoot"/>
+      </p:par>
+    </p:tnLst>
+  </p:timing>
+</p:sld>
+</file>
+
+<file path=ppt/slides/slide8.xml><?xml version="1.0" encoding="utf-8"?>
+<p:sld xmlns:a="http://schemas.openxmlformats.org/drawingml/2006/main" xmlns:r="http://schemas.openxmlformats.org/officeDocument/2006/relationships" xmlns:p="http://schemas.openxmlformats.org/presentationml/2006/main">
+  <p:cSld>
+    <p:spTree>
+      <p:nvGrpSpPr>
+        <p:cNvPr id="1" name=""/>
+        <p:cNvGrpSpPr/>
+        <p:nvPr/>
+      </p:nvGrpSpPr>
+      <p:grpSpPr>
+        <a:xfrm>
+          <a:off x="0" y="0"/>
+          <a:ext cx="0" cy="0"/>
+          <a:chOff x="0" y="0"/>
+          <a:chExt cx="0" cy="0"/>
+        </a:xfrm>
+      </p:grpSpPr>
+      <p:sp>
+        <p:nvSpPr>
+          <p:cNvPr id="2" name="Titel 1"/>
+          <p:cNvSpPr>
+            <a:spLocks noGrp="1"/>
+          </p:cNvSpPr>
+          <p:nvPr>
+            <p:ph type="title"/>
+          </p:nvPr>
+        </p:nvSpPr>
+        <p:spPr/>
+        <p:txBody>
+          <a:bodyPr/>
+          <a:lstStyle/>
+          <a:p>
+            <a:r>
+              <a:rPr lang="de-DE" dirty="0"/>
+              <a:t>Wann wird übergeben?</a:t>
+            </a:r>
+          </a:p>
+        </p:txBody>
+      </p:sp>
+      <p:pic>
+        <p:nvPicPr>
+          <p:cNvPr id="6" name="Inhaltsplatzhalter 5"/>
+          <p:cNvPicPr>
+            <a:picLocks noGrp="1" noChangeAspect="1"/>
+          </p:cNvPicPr>
+          <p:nvPr>
+            <p:ph idx="1"/>
+          </p:nvPr>
+        </p:nvPicPr>
+        <p:blipFill>
+          <a:blip r:embed="rId2">
+            <a:extLst>
+              <a:ext uri="{28A0092B-C50C-407E-A947-70E740481C1C}">
+                <a14:useLocalDpi xmlns:a14="http://schemas.microsoft.com/office/drawing/2010/main" val="0"/>
+              </a:ext>
+            </a:extLst>
+          </a:blip>
+          <a:stretch>
+            <a:fillRect/>
+          </a:stretch>
+        </p:blipFill>
+        <p:spPr>
+          <a:xfrm>
+            <a:off x="915822" y="1600200"/>
+            <a:ext cx="7312355" cy="4525963"/>
+          </a:xfrm>
+        </p:spPr>
+      </p:pic>
+      <p:sp>
+        <p:nvSpPr>
+          <p:cNvPr id="4" name="Foliennummernplatzhalter 3"/>
+          <p:cNvSpPr>
+            <a:spLocks noGrp="1"/>
+          </p:cNvSpPr>
+          <p:nvPr>
+            <p:ph type="sldNum" sz="quarter" idx="11"/>
+          </p:nvPr>
+        </p:nvSpPr>
+        <p:spPr/>
+        <p:txBody>
+          <a:bodyPr/>
+          <a:lstStyle/>
+          <a:p>
+            <a:fld id="{8F7FB5C4-64A8-4489-A065-F733EF225B1A}" type="slidenum">
+              <a:rPr lang="de-DE" smtClean="0"/>
+              <a:t>8</a:t>
+            </a:fld>
+            <a:endParaRPr lang="de-DE"/>
+          </a:p>
+        </p:txBody>
+      </p:sp>
+      <p:sp>
+        <p:nvSpPr>
+          <p:cNvPr id="5" name="Fußzeilenplatzhalter 4"/>
+          <p:cNvSpPr>
+            <a:spLocks noGrp="1"/>
+          </p:cNvSpPr>
+          <p:nvPr>
+            <p:ph type="ftr" sz="quarter" idx="3"/>
+          </p:nvPr>
+        </p:nvSpPr>
+        <p:spPr/>
+        <p:txBody>
+          <a:bodyPr/>
+          <a:lstStyle/>
+          <a:p>
+            <a:r>
+              <a:rPr lang="en-US" smtClean="0"/>
+              <a:t>Manuel Wurth, Christian Weber – 20.01.2016</a:t>
+            </a:r>
+            <a:endParaRPr lang="de-DE" dirty="0"/>
+          </a:p>
+        </p:txBody>
+      </p:sp>
+    </p:spTree>
+    <p:extLst>
+      <p:ext uri="{BB962C8B-B14F-4D97-AF65-F5344CB8AC3E}">
+        <p14:creationId xmlns:p14="http://schemas.microsoft.com/office/powerpoint/2010/main" val="3309697850"/>
+      </p:ext>
+    </p:extLst>
+  </p:cSld>
+  <p:clrMapOvr>
+    <a:masterClrMapping/>
+  </p:clrMapOvr>
+  <p:transition spd="med"/>
+  <p:timing>
+    <p:tnLst>
+      <p:par>
+        <p:cTn id="1" dur="indefinite" restart="never" nodeType="tmRoot"/>
+      </p:par>
+    </p:tnLst>
+  </p:timing>
+</p:sld>
+</file>
+
+<file path=ppt/slides/slide9.xml><?xml version="1.0" encoding="utf-8"?>
+<p:sld xmlns:a="http://schemas.openxmlformats.org/drawingml/2006/main" xmlns:r="http://schemas.openxmlformats.org/officeDocument/2006/relationships" xmlns:p="http://schemas.openxmlformats.org/presentationml/2006/main">
+  <p:cSld>
+    <p:spTree>
+      <p:nvGrpSpPr>
+        <p:cNvPr id="1" name=""/>
+        <p:cNvGrpSpPr/>
+        <p:nvPr/>
+      </p:nvGrpSpPr>
+      <p:grpSpPr>
+        <a:xfrm>
+          <a:off x="0" y="0"/>
+          <a:ext cx="0" cy="0"/>
+          <a:chOff x="0" y="0"/>
+          <a:chExt cx="0" cy="0"/>
+        </a:xfrm>
+      </p:grpSpPr>
+      <p:sp>
+        <p:nvSpPr>
+          <p:cNvPr id="2" name="Titel 1"/>
+          <p:cNvSpPr>
+            <a:spLocks noGrp="1"/>
+          </p:cNvSpPr>
+          <p:nvPr>
+            <p:ph type="title"/>
+          </p:nvPr>
+        </p:nvSpPr>
+        <p:spPr/>
+        <p:txBody>
+          <a:bodyPr/>
+          <a:lstStyle/>
+          <a:p>
+            <a:r>
+              <a:rPr lang="de-DE" dirty="0"/>
+              <a:t>Wann wird übergeben?</a:t>
+            </a:r>
+          </a:p>
+        </p:txBody>
+      </p:sp>
+      <p:sp>
+        <p:nvSpPr>
+          <p:cNvPr id="4" name="Foliennummernplatzhalter 3"/>
+          <p:cNvSpPr>
+            <a:spLocks noGrp="1"/>
+          </p:cNvSpPr>
+          <p:nvPr>
+            <p:ph type="sldNum" sz="quarter" idx="11"/>
+          </p:nvPr>
+        </p:nvSpPr>
+        <p:spPr/>
+        <p:txBody>
+          <a:bodyPr/>
+          <a:lstStyle/>
+          <a:p>
+            <a:fld id="{8F7FB5C4-64A8-4489-A065-F733EF225B1A}" type="slidenum">
+              <a:rPr lang="de-DE" smtClean="0"/>
+              <a:t>9</a:t>
+            </a:fld>
+            <a:endParaRPr lang="de-DE"/>
+          </a:p>
+        </p:txBody>
+      </p:sp>
+      <p:sp>
+        <p:nvSpPr>
+          <p:cNvPr id="5" name="Fußzeilenplatzhalter 4"/>
+          <p:cNvSpPr>
+            <a:spLocks noGrp="1"/>
+          </p:cNvSpPr>
+          <p:nvPr>
+            <p:ph type="ftr" sz="quarter" idx="3"/>
+          </p:nvPr>
+        </p:nvSpPr>
+        <p:spPr/>
+        <p:txBody>
+          <a:bodyPr/>
+          <a:lstStyle/>
+          <a:p>
+            <a:r>
+              <a:rPr lang="en-US" smtClean="0"/>
+              <a:t>Manuel Wurth, Christian Weber – 20.01.2016</a:t>
+            </a:r>
+            <a:endParaRPr lang="de-DE" dirty="0"/>
+          </a:p>
+        </p:txBody>
+      </p:sp>
+      <p:pic>
+        <p:nvPicPr>
+          <p:cNvPr id="7" name="Inhaltsplatzhalter 6"/>
+          <p:cNvPicPr>
+            <a:picLocks noGrp="1" noChangeAspect="1"/>
+          </p:cNvPicPr>
+          <p:nvPr>
+            <p:ph idx="1"/>
+          </p:nvPr>
+        </p:nvPicPr>
+        <p:blipFill>
+          <a:blip r:embed="rId2">
+            <a:extLst>
+              <a:ext uri="{28A0092B-C50C-407E-A947-70E740481C1C}">
+                <a14:useLocalDpi xmlns:a14="http://schemas.microsoft.com/office/drawing/2010/main" val="0"/>
+              </a:ext>
+            </a:extLst>
+          </a:blip>
+          <a:stretch>
+            <a:fillRect/>
+          </a:stretch>
+        </p:blipFill>
+        <p:spPr>
+          <a:xfrm>
+            <a:off x="915823" y="1600200"/>
+            <a:ext cx="7312354" cy="4525963"/>
+          </a:xfrm>
+        </p:spPr>
+      </p:pic>
+    </p:spTree>
+    <p:extLst>
+      <p:ext uri="{BB962C8B-B14F-4D97-AF65-F5344CB8AC3E}">
+        <p14:creationId xmlns:p14="http://schemas.microsoft.com/office/powerpoint/2010/main" val="3368001781"/>
       </p:ext>
     </p:extLst>
   </p:cSld>

</xml_diff>

<commit_message>
Replaced Pictures of Code with Word representations
</commit_message>
<xml_diff>
--- a/Documentation/Präsentation/Präsentation.pptx
+++ b/Documentation/Präsentation/Präsentation.pptx
@@ -203,7 +203,7 @@
       </p14:sectionLst>
     </p:ext>
     <p:ext uri="{EFAFB233-063F-42B5-8137-9DF3F51BA10A}">
-      <p15:sldGuideLst xmlns="" xmlns:p15="http://schemas.microsoft.com/office/powerpoint/2012/main">
+      <p15:sldGuideLst xmlns:p15="http://schemas.microsoft.com/office/powerpoint/2012/main">
         <p15:guide id="1" orient="horz" pos="2160">
           <p15:clr>
             <a:srgbClr val="A4A3A4"/>
@@ -217,7 +217,7 @@
       </p15:sldGuideLst>
     </p:ext>
     <p:ext uri="{2D200454-40CA-4A62-9FC3-DE9A4176ACB9}">
-      <p15:notesGuideLst xmlns="" xmlns:p15="http://schemas.microsoft.com/office/powerpoint/2012/main">
+      <p15:notesGuideLst xmlns:p15="http://schemas.microsoft.com/office/powerpoint/2012/main">
         <p15:guide id="1" orient="horz" pos="3102">
           <p15:clr>
             <a:srgbClr val="A4A3A4"/>
@@ -1449,11 +1449,7 @@
             </a:r>
             <a:r>
               <a:rPr lang="de-DE" baseline="0" dirty="0" smtClean="0"/>
-              <a:t> 2 und 3 sind immer </a:t>
-            </a:r>
-            <a:r>
-              <a:rPr lang="de-DE" baseline="0" dirty="0" smtClean="0"/>
-              <a:t>genau dann </a:t>
+              <a:t> 2 und 3 sind immer genau dann </a:t>
             </a:r>
             <a:r>
               <a:rPr lang="de-DE" baseline="0" dirty="0" err="1" smtClean="0"/>
@@ -1467,23 +1463,7 @@
           <a:p>
             <a:r>
               <a:rPr lang="de-DE" baseline="0" dirty="0" smtClean="0"/>
-              <a:t>Das wissen wir, weil wir </a:t>
-            </a:r>
-            <a:r>
-              <a:rPr lang="de-DE" baseline="0" dirty="0" smtClean="0"/>
-              <a:t>bei der </a:t>
-            </a:r>
-            <a:r>
-              <a:rPr lang="de-DE" baseline="0" dirty="0" smtClean="0"/>
-              <a:t>Übergabe auf diese Stages </a:t>
-            </a:r>
-            <a:r>
-              <a:rPr lang="de-DE" baseline="0" dirty="0" smtClean="0"/>
-              <a:t>ne Platzhalter-Werkstück-Position </a:t>
-            </a:r>
-            <a:r>
-              <a:rPr lang="de-DE" baseline="0" dirty="0" smtClean="0"/>
-              <a:t>von -2 setzen.</a:t>
+              <a:t>Das wissen wir, weil wir bei der Übergabe auf diese Stages ne Platzhalter-Werkstück-Position von -2 setzen.</a:t>
             </a:r>
           </a:p>
           <a:p>
@@ -1497,11 +1477,7 @@
             </a:r>
             <a:r>
               <a:rPr lang="de-DE" baseline="0" dirty="0" smtClean="0"/>
-              <a:t> </a:t>
-            </a:r>
-            <a:r>
-              <a:rPr lang="de-DE" baseline="0" dirty="0" smtClean="0"/>
-              <a:t>Werkstück auf dem Band hat, wird versucht dieses Werkstück in die Lichtschranke zu bekommen.</a:t>
+              <a:t> Werkstück auf dem Band hat, wird versucht dieses Werkstück in die Lichtschranke zu bekommen.</a:t>
             </a:r>
           </a:p>
           <a:p>
@@ -1515,25 +1491,13 @@
             </a:r>
             <a:r>
               <a:rPr lang="de-DE" baseline="0" dirty="0" smtClean="0"/>
-              <a:t> dann die </a:t>
-            </a:r>
+              <a:t> dann die Mitte der Lichtschranke erreicht hat, wird eine korrekte Position für dieses Werkstück gesetzt.</a:t>
+            </a:r>
+          </a:p>
+          <a:p>
             <a:r>
               <a:rPr lang="de-DE" baseline="0" dirty="0" smtClean="0"/>
-              <a:t>Mitte der Lichtschranke erreicht hat, wird eine korrekte Position für dieses Werkstück gesetzt.</a:t>
-            </a:r>
-          </a:p>
-          <a:p>
-            <a:r>
-              <a:rPr lang="de-DE" baseline="0" dirty="0" smtClean="0"/>
-              <a:t>Wir setzten die </a:t>
-            </a:r>
-            <a:r>
-              <a:rPr lang="de-DE" baseline="0" dirty="0" smtClean="0"/>
-              <a:t>Positionen </a:t>
-            </a:r>
-            <a:r>
-              <a:rPr lang="de-DE" baseline="0" dirty="0" smtClean="0"/>
-              <a:t>also nie schon am Anfang des Laufbands, weil wir nicht genau wissen können, wie gut das Laufband das Werkstück annimmt.</a:t>
+              <a:t>Wir setzten die Positionen also nie schon am Anfang des Laufbands, weil wir nicht genau wissen können, wie gut das Laufband das Werkstück annimmt.</a:t>
             </a:r>
           </a:p>
           <a:p>
@@ -1561,11 +1525,7 @@
           <a:p>
             <a:r>
               <a:rPr lang="de-DE" baseline="0" dirty="0" smtClean="0"/>
-              <a:t>Also legen wir die korrekte Position erst dann fest, wenn wir sie sicher kennen, nämlich bei der Lichtschranke</a:t>
-            </a:r>
-            <a:r>
-              <a:rPr lang="de-DE" baseline="0" dirty="0" smtClean="0"/>
-              <a:t>.</a:t>
+              <a:t>Also legen wir die korrekte Position erst dann fest, wenn wir sie sicher kennen, nämlich bei der Lichtschranke.</a:t>
             </a:r>
           </a:p>
           <a:p>
@@ -1582,11 +1542,7 @@
             </a:r>
             <a:r>
               <a:rPr lang="de-DE" baseline="0" dirty="0" smtClean="0"/>
-              <a:t>. Ansonsten schon</a:t>
-            </a:r>
-            <a:r>
-              <a:rPr lang="de-DE" baseline="0" dirty="0" smtClean="0"/>
-              <a:t>.</a:t>
+              <a:t>. Ansonsten schon.</a:t>
             </a:r>
           </a:p>
           <a:p>
@@ -2570,15 +2526,7 @@
             </a:r>
             <a:r>
               <a:rPr lang="de-DE" baseline="0" dirty="0" smtClean="0"/>
-              <a:t> muss ich zuerst mal </a:t>
-            </a:r>
-            <a:r>
-              <a:rPr lang="de-DE" baseline="0" dirty="0" smtClean="0"/>
-              <a:t>sagen, </a:t>
-            </a:r>
-            <a:r>
-              <a:rPr lang="de-DE" baseline="0" dirty="0" smtClean="0"/>
-              <a:t>dass wir die einzelnen Stationen getrennt haben.</a:t>
+              <a:t> muss ich zuerst mal sagen, dass wir die einzelnen Stationen getrennt haben.</a:t>
             </a:r>
           </a:p>
           <a:p>
@@ -2626,7 +2574,6 @@
               <a:rPr lang="de-DE" baseline="0" dirty="0" smtClean="0"/>
               <a:t>, für alle Daten die sie halt braucht.</a:t>
             </a:r>
-            <a:endParaRPr lang="de-DE" baseline="0" dirty="0" smtClean="0"/>
           </a:p>
           <a:p>
             <a:r>
@@ -2748,33 +2695,12 @@
           <a:p>
             <a:r>
               <a:rPr lang="de-DE" dirty="0" smtClean="0"/>
-              <a:t>Dann muss ich prinzipiell was zum Ablauf </a:t>
-            </a:r>
-            <a:r>
-              <a:rPr lang="de-DE" dirty="0" smtClean="0"/>
-              <a:t>erzählen</a:t>
-            </a:r>
-            <a:r>
-              <a:rPr lang="de-DE" dirty="0" smtClean="0"/>
-              <a:t>,</a:t>
+              <a:t>Dann muss ich prinzipiell was zum Ablauf erzählen,</a:t>
             </a:r>
             <a:r>
               <a:rPr lang="de-DE" baseline="0" dirty="0" smtClean="0"/>
-              <a:t> </a:t>
-            </a:r>
-            <a:r>
-              <a:rPr lang="de-DE" baseline="0" dirty="0" smtClean="0"/>
-              <a:t>aber ich geh mal davon aus, dass das </a:t>
-            </a:r>
-            <a:r>
-              <a:rPr lang="de-DE" baseline="0" dirty="0" smtClean="0"/>
-              <a:t>wohl alle </a:t>
-            </a:r>
-            <a:r>
-              <a:rPr lang="de-DE" baseline="0" dirty="0" smtClean="0"/>
-              <a:t>so oder so ähnlich machen.</a:t>
-            </a:r>
-            <a:endParaRPr lang="de-DE" baseline="0" dirty="0" smtClean="0"/>
+              <a:t> aber ich geh mal davon aus, dass das wohl alle so oder so ähnlich machen.</a:t>
+            </a:r>
           </a:p>
           <a:p>
             <a:r>
@@ -2914,13 +2840,8 @@
           <a:p>
             <a:r>
               <a:rPr lang="de-DE" baseline="0" dirty="0" smtClean="0"/>
-              <a:t>Also wäre die Lösung dafür ganz einfach: Laufband laufen </a:t>
-            </a:r>
-            <a:r>
-              <a:rPr lang="de-DE" baseline="0" dirty="0" smtClean="0"/>
-              <a:t>lassen, während man schiebt.</a:t>
-            </a:r>
-            <a:endParaRPr lang="de-DE" baseline="0" dirty="0" smtClean="0"/>
+              <a:t>Also wäre die Lösung dafür ganz einfach: Laufband laufen lassen, während man schiebt.</a:t>
+            </a:r>
           </a:p>
           <a:p>
             <a:r>
@@ -3050,21 +2971,13 @@
             </a:r>
             <a:r>
               <a:rPr lang="de-DE" baseline="0" dirty="0" smtClean="0"/>
-              <a:t> nicht </a:t>
-            </a:r>
+              <a:t> nicht bewegen? </a:t>
+            </a:r>
+          </a:p>
+          <a:p>
             <a:r>
               <a:rPr lang="de-DE" baseline="0" dirty="0" smtClean="0"/>
-              <a:t>bewegen? </a:t>
-            </a:r>
-          </a:p>
-          <a:p>
-            <a:r>
-              <a:rPr lang="de-DE" baseline="0" dirty="0" smtClean="0"/>
-              <a:t>Weil </a:t>
-            </a:r>
-            <a:r>
-              <a:rPr lang="de-DE" baseline="0" dirty="0" smtClean="0"/>
-              <a:t>am Ende ein Werkstück liegt, und gleichzeitig die nächste </a:t>
+              <a:t>Weil am Ende ein Werkstück liegt, und gleichzeitig die nächste </a:t>
             </a:r>
             <a:r>
               <a:rPr lang="de-DE" baseline="0" dirty="0" err="1" smtClean="0"/>
@@ -3280,11 +3193,7 @@
             </a:r>
             <a:r>
               <a:rPr lang="de-DE" baseline="0" dirty="0" smtClean="0"/>
-              <a:t> schieben, und in den allermeisten Fällen keine Probleme haben, oder eben </a:t>
-            </a:r>
-            <a:r>
-              <a:rPr lang="de-DE" baseline="0" dirty="0" smtClean="0"/>
-              <a:t>erst auf das Laufband warten und mit weniger Durchsatz leben.</a:t>
+              <a:t> schieben, und in den allermeisten Fällen keine Probleme haben, oder eben erst auf das Laufband warten und mit weniger Durchsatz leben.</a:t>
             </a:r>
             <a:endParaRPr lang="de-DE" dirty="0" smtClean="0"/>
           </a:p>
@@ -3295,11 +3204,7 @@
             </a:r>
             <a:r>
               <a:rPr lang="de-DE" baseline="0" dirty="0" smtClean="0"/>
-              <a:t> hab das ganze so interpretiert, dass wir den Durchsatz zumindest halbwegs maximieren sollten</a:t>
-            </a:r>
-            <a:r>
-              <a:rPr lang="de-DE" baseline="0" dirty="0" smtClean="0"/>
-              <a:t>.</a:t>
+              <a:t> hab das ganze so interpretiert, dass wir den Durchsatz zumindest halbwegs maximieren sollten.</a:t>
             </a:r>
           </a:p>
           <a:p>
@@ -3307,16 +3212,11 @@
               <a:rPr lang="de-DE" baseline="0" dirty="0" smtClean="0"/>
               <a:t>Deshalb haben wir uns dazu entschieden Werkstücke auf nicht drehende Laufbänder zu schieben.</a:t>
             </a:r>
-            <a:endParaRPr lang="de-DE" baseline="0" dirty="0" smtClean="0"/>
           </a:p>
           <a:p>
             <a:r>
               <a:rPr lang="de-DE" baseline="0" dirty="0" smtClean="0"/>
-              <a:t>Klar</a:t>
-            </a:r>
-            <a:r>
-              <a:rPr lang="de-DE" baseline="0" dirty="0" smtClean="0"/>
-              <a:t>, </a:t>
+              <a:t>Klar, </a:t>
             </a:r>
             <a:r>
               <a:rPr lang="de-DE" baseline="0" dirty="0" err="1" smtClean="0"/>
@@ -3332,11 +3232,7 @@
             </a:r>
             <a:r>
               <a:rPr lang="de-DE" baseline="0" dirty="0" smtClean="0"/>
-              <a:t>, aber das ist wie gesagt eher selten der </a:t>
-            </a:r>
-            <a:r>
-              <a:rPr lang="de-DE" baseline="0" dirty="0" smtClean="0"/>
-              <a:t>Fall.</a:t>
+              <a:t>, aber das ist wie gesagt eher selten der Fall.</a:t>
             </a:r>
           </a:p>
           <a:p>
@@ -3352,7 +3248,6 @@
               <a:rPr lang="de-DE" baseline="0" dirty="0" smtClean="0"/>
               <a:t> in aller Regel trotzdem.</a:t>
             </a:r>
-            <a:endParaRPr lang="de-DE" baseline="0" dirty="0" smtClean="0"/>
           </a:p>
           <a:p>
             <a:endParaRPr lang="de-DE" dirty="0" smtClean="0"/>
@@ -3467,11 +3362,7 @@
             </a:r>
             <a:r>
               <a:rPr lang="de-DE" baseline="0" dirty="0" smtClean="0"/>
-              <a:t> </a:t>
-            </a:r>
-            <a:r>
-              <a:rPr lang="de-DE" baseline="0" dirty="0" smtClean="0"/>
-              <a:t>auf die </a:t>
+              <a:t> auf die </a:t>
             </a:r>
             <a:r>
               <a:rPr lang="de-DE" baseline="0" dirty="0" err="1" smtClean="0"/>
@@ -3479,15 +3370,7 @@
             </a:r>
             <a:r>
               <a:rPr lang="de-DE" baseline="0" dirty="0" smtClean="0"/>
-              <a:t> </a:t>
-            </a:r>
-            <a:r>
-              <a:rPr lang="de-DE" baseline="0" dirty="0" smtClean="0"/>
-              <a:t>transportieren </a:t>
-            </a:r>
-            <a:r>
-              <a:rPr lang="de-DE" baseline="0" dirty="0" smtClean="0"/>
-              <a:t>darf.</a:t>
+              <a:t> transportieren darf.</a:t>
             </a:r>
           </a:p>
           <a:p>
@@ -3514,15 +3397,7 @@
             </a:r>
             <a:r>
               <a:rPr lang="de-DE" baseline="0" dirty="0" smtClean="0"/>
-              <a:t> erste </a:t>
-            </a:r>
-            <a:r>
-              <a:rPr lang="de-DE" baseline="0" dirty="0" smtClean="0"/>
-              <a:t>Laufband </a:t>
-            </a:r>
-            <a:r>
-              <a:rPr lang="de-DE" baseline="0" dirty="0" smtClean="0"/>
-              <a:t>ist immer </a:t>
+              <a:t> erste Laufband ist immer </a:t>
             </a:r>
             <a:r>
               <a:rPr lang="de-DE" baseline="0" dirty="0" err="1" smtClean="0"/>
@@ -3530,19 +3405,7 @@
             </a:r>
             <a:r>
               <a:rPr lang="de-DE" baseline="0" dirty="0" smtClean="0"/>
-              <a:t>, </a:t>
-            </a:r>
-            <a:r>
-              <a:rPr lang="de-DE" baseline="0" dirty="0" smtClean="0"/>
-              <a:t>weil es schlicht keinen Vorgänger hat. Also soll es immer Werkstücke </a:t>
-            </a:r>
-            <a:r>
-              <a:rPr lang="de-DE" baseline="0" dirty="0" smtClean="0"/>
-              <a:t>annehmen</a:t>
-            </a:r>
-            <a:r>
-              <a:rPr lang="de-DE" baseline="0" dirty="0" smtClean="0"/>
-              <a:t>, wenn der Arbeiter sie drauflegt.</a:t>
+              <a:t>, weil es schlicht keinen Vorgänger hat. Also soll es immer Werkstücke annehmen, wenn der Arbeiter sie drauflegt.</a:t>
             </a:r>
           </a:p>
           <a:p>
@@ -3559,11 +3422,7 @@
             </a:r>
             <a:r>
               <a:rPr lang="de-DE" baseline="0" dirty="0" smtClean="0"/>
-              <a:t>, wenn </a:t>
-            </a:r>
-            <a:r>
-              <a:rPr lang="de-DE" baseline="0" dirty="0" smtClean="0"/>
-              <a:t>der hintere </a:t>
+              <a:t>, wenn der hintere </a:t>
             </a:r>
             <a:r>
               <a:rPr lang="de-DE" baseline="0" dirty="0" err="1" smtClean="0"/>
@@ -3571,22 +3430,13 @@
             </a:r>
             <a:r>
               <a:rPr lang="de-DE" baseline="0" dirty="0" smtClean="0"/>
-              <a:t> aktiviert ist und </a:t>
-            </a:r>
-            <a:r>
-              <a:rPr lang="de-DE" baseline="0" dirty="0" smtClean="0"/>
-              <a:t>sie nicht belegt sind.</a:t>
-            </a:r>
-            <a:endParaRPr lang="de-DE" baseline="0" dirty="0" smtClean="0"/>
+              <a:t> aktiviert ist und sie nicht belegt sind.</a:t>
+            </a:r>
           </a:p>
           <a:p>
             <a:r>
               <a:rPr lang="de-DE" dirty="0" smtClean="0"/>
-              <a:t>Das sieht man in diesen 8 </a:t>
-            </a:r>
-            <a:r>
-              <a:rPr lang="de-DE" dirty="0" smtClean="0"/>
-              <a:t>Zeilen </a:t>
+              <a:t>Das sieht man in diesen 8 Zeilen </a:t>
             </a:r>
             <a:r>
               <a:rPr lang="de-DE" dirty="0" err="1" smtClean="0"/>
@@ -8260,7 +8110,7 @@
           <a:graphicData uri="http://schemas.openxmlformats.org/presentationml/2006/ole">
             <mc:AlternateContent xmlns:mc="http://schemas.openxmlformats.org/markup-compatibility/2006">
               <mc:Choice xmlns:v="urn:schemas-microsoft-com:vml" Requires="v">
-                <p:oleObj spid="_x0000_s2129" name="Dokument" r:id="rId4" imgW="6100084" imgH="4063581" progId="Word.Document.12">
+                <p:oleObj spid="_x0000_s2131" name="Dokument" r:id="rId4" imgW="6100084" imgH="4063581" progId="Word.Document.12">
                   <p:embed/>
                 </p:oleObj>
               </mc:Choice>
@@ -8486,7 +8336,7 @@
           <a:graphicData uri="http://schemas.openxmlformats.org/presentationml/2006/ole">
             <mc:AlternateContent xmlns:mc="http://schemas.openxmlformats.org/markup-compatibility/2006">
               <mc:Choice xmlns:v="urn:schemas-microsoft-com:vml" Requires="v">
-                <p:oleObj spid="_x0000_s3152" name="Dokument" r:id="rId4" imgW="6100084" imgH="4063581" progId="Word.Document.12">
+                <p:oleObj spid="_x0000_s3154" name="Dokument" r:id="rId4" imgW="6100084" imgH="4063581" progId="Word.Document.12">
                   <p:embed/>
                 </p:oleObj>
               </mc:Choice>
@@ -8946,7 +8796,7 @@
           <a:graphicData uri="http://schemas.openxmlformats.org/presentationml/2006/ole">
             <mc:AlternateContent xmlns:mc="http://schemas.openxmlformats.org/markup-compatibility/2006">
               <mc:Choice xmlns:v="urn:schemas-microsoft-com:vml" Requires="v">
-                <p:oleObj spid="_x0000_s5199" name="Dokument" r:id="rId4" imgW="6100084" imgH="4063581" progId="Word.Document.12">
+                <p:oleObj spid="_x0000_s5201" name="Dokument" r:id="rId4" imgW="6100084" imgH="4063581" progId="Word.Document.12">
                   <p:embed/>
                 </p:oleObj>
               </mc:Choice>
@@ -9252,25 +9102,25 @@
             <p:ph idx="1"/>
             <p:extLst>
               <p:ext uri="{D42A27DB-BD31-4B8C-83A1-F6EECF244321}">
-                <p14:modId xmlns:p14="http://schemas.microsoft.com/office/powerpoint/2010/main" val="2557103402"/>
+                <p14:modId xmlns:p14="http://schemas.microsoft.com/office/powerpoint/2010/main" val="2025976666"/>
               </p:ext>
             </p:extLst>
           </p:nvPr>
         </p:nvGraphicFramePr>
         <p:xfrm>
-          <a:off x="755650" y="1493838"/>
-          <a:ext cx="7843838" cy="4476750"/>
+          <a:off x="757238" y="1497013"/>
+          <a:ext cx="7839075" cy="4470400"/>
         </p:xfrm>
         <a:graphic>
           <a:graphicData uri="http://schemas.openxmlformats.org/presentationml/2006/ole">
             <mc:AlternateContent xmlns:mc="http://schemas.openxmlformats.org/markup-compatibility/2006">
               <mc:Choice xmlns:v="urn:schemas-microsoft-com:vml" Requires="v">
-                <p:oleObj spid="_x0000_s4176" name="Dokument" r:id="rId4" imgW="7106915" imgH="4055302" progId="Word.Document.12">
+                <p:oleObj spid="_x0000_s4179" name="Dokument" r:id="rId4" imgW="7092137" imgH="4043250" progId="Word.Document.12">
                   <p:embed/>
                 </p:oleObj>
               </mc:Choice>
               <mc:Fallback>
-                <p:oleObj name="Dokument" r:id="rId4" imgW="7106915" imgH="4055302" progId="Word.Document.12">
+                <p:oleObj name="Dokument" r:id="rId4" imgW="7092137" imgH="4043250" progId="Word.Document.12">
                   <p:embed/>
                   <p:pic>
                     <p:nvPicPr>
@@ -9286,8 +9136,8 @@
                     </p:blipFill>
                     <p:spPr>
                       <a:xfrm>
-                        <a:off x="755650" y="1493838"/>
-                        <a:ext cx="7843838" cy="4476750"/>
+                        <a:off x="757238" y="1497013"/>
+                        <a:ext cx="7839075" cy="4470400"/>
                       </a:xfrm>
                       <a:prstGeom prst="rect">
                         <a:avLst/>
@@ -9600,7 +9450,7 @@
           <a:graphicData uri="http://schemas.openxmlformats.org/presentationml/2006/ole">
             <mc:AlternateContent xmlns:mc="http://schemas.openxmlformats.org/markup-compatibility/2006">
               <mc:Choice xmlns:v="urn:schemas-microsoft-com:vml" Requires="v">
-                <p:oleObj spid="_x0000_s6298" name="Dokument" r:id="rId4" imgW="6100084" imgH="4063581" progId="Word.Document.12">
+                <p:oleObj spid="_x0000_s6302" name="Dokument" r:id="rId4" imgW="6100084" imgH="4063581" progId="Word.Document.12">
                   <p:embed/>
                 </p:oleObj>
               </mc:Choice>
@@ -9657,7 +9507,7 @@
           <a:graphicData uri="http://schemas.openxmlformats.org/presentationml/2006/ole">
             <mc:AlternateContent xmlns:mc="http://schemas.openxmlformats.org/markup-compatibility/2006">
               <mc:Choice xmlns:v="urn:schemas-microsoft-com:vml" Requires="v">
-                <p:oleObj spid="_x0000_s6299" name="Dokument" r:id="rId6" imgW="9081298" imgH="4056021" progId="Word.Document.12">
+                <p:oleObj spid="_x0000_s6303" name="Dokument" r:id="rId6" imgW="9081298" imgH="4056021" progId="Word.Document.12">
                   <p:embed/>
                 </p:oleObj>
               </mc:Choice>
@@ -9881,25 +9731,6 @@
       </p:sp>
       <p:sp>
         <p:nvSpPr>
-          <p:cNvPr id="3" name="Inhaltsplatzhalter 2"/>
-          <p:cNvSpPr>
-            <a:spLocks noGrp="1"/>
-          </p:cNvSpPr>
-          <p:nvPr>
-            <p:ph idx="1"/>
-          </p:nvPr>
-        </p:nvSpPr>
-        <p:spPr/>
-        <p:txBody>
-          <a:bodyPr/>
-          <a:lstStyle/>
-          <a:p>
-            <a:endParaRPr lang="de-DE" dirty="0"/>
-          </a:p>
-        </p:txBody>
-      </p:sp>
-      <p:sp>
-        <p:nvSpPr>
           <p:cNvPr id="4" name="Foliennummernplatzhalter 3"/>
           <p:cNvSpPr>
             <a:spLocks noGrp="1"/>
@@ -9944,30 +9775,130 @@
           </a:p>
         </p:txBody>
       </p:sp>
-      <p:pic>
-        <p:nvPicPr>
-          <p:cNvPr id="7" name="Grafik 6"/>
-          <p:cNvPicPr>
-            <a:picLocks noChangeAspect="1"/>
-          </p:cNvPicPr>
+      <p:graphicFrame>
+        <p:nvGraphicFramePr>
+          <p:cNvPr id="6" name="Inhaltsplatzhalter 5"/>
+          <p:cNvGraphicFramePr>
+            <a:graphicFrameLocks noGrp="1" noChangeAspect="1"/>
+          </p:cNvGraphicFramePr>
+          <p:nvPr>
+            <p:ph idx="1"/>
+            <p:extLst>
+              <p:ext uri="{D42A27DB-BD31-4B8C-83A1-F6EECF244321}">
+                <p14:modId xmlns:p14="http://schemas.microsoft.com/office/powerpoint/2010/main" val="131245187"/>
+              </p:ext>
+            </p:extLst>
+          </p:nvPr>
+        </p:nvGraphicFramePr>
+        <p:xfrm>
+          <a:off x="1044575" y="2054225"/>
+          <a:ext cx="7389813" cy="3355975"/>
+        </p:xfrm>
+        <a:graphic>
+          <a:graphicData uri="http://schemas.openxmlformats.org/presentationml/2006/ole">
+            <mc:AlternateContent xmlns:mc="http://schemas.openxmlformats.org/markup-compatibility/2006">
+              <mc:Choice xmlns:v="urn:schemas-microsoft-com:vml" Requires="v">
+                <p:oleObj spid="_x0000_s9219" name="Dokument" r:id="rId3" imgW="4665322" imgH="2119211" progId="Word.Document.12">
+                  <p:embed/>
+                </p:oleObj>
+              </mc:Choice>
+              <mc:Fallback>
+                <p:oleObj name="Dokument" r:id="rId3" imgW="4665322" imgH="2119211" progId="Word.Document.12">
+                  <p:embed/>
+                  <p:pic>
+                    <p:nvPicPr>
+                      <p:cNvPr id="0" name=""/>
+                      <p:cNvPicPr/>
+                      <p:nvPr/>
+                    </p:nvPicPr>
+                    <p:blipFill>
+                      <a:blip r:embed="rId4"/>
+                      <a:stretch>
+                        <a:fillRect/>
+                      </a:stretch>
+                    </p:blipFill>
+                    <p:spPr>
+                      <a:xfrm>
+                        <a:off x="1044575" y="2054225"/>
+                        <a:ext cx="7389813" cy="3355975"/>
+                      </a:xfrm>
+                      <a:prstGeom prst="rect">
+                        <a:avLst/>
+                      </a:prstGeom>
+                    </p:spPr>
+                  </p:pic>
+                </p:oleObj>
+              </mc:Fallback>
+            </mc:AlternateContent>
+          </a:graphicData>
+        </a:graphic>
+      </p:graphicFrame>
+      <p:sp>
+        <p:nvSpPr>
+          <p:cNvPr id="8" name="Rechteck 7"/>
+          <p:cNvSpPr/>
           <p:nvPr/>
-        </p:nvPicPr>
-        <p:blipFill>
-          <a:blip r:embed="rId2"/>
-          <a:stretch>
-            <a:fillRect/>
-          </a:stretch>
-        </p:blipFill>
-        <p:spPr>
+        </p:nvSpPr>
+        <p:spPr bwMode="auto">
           <a:xfrm>
-            <a:off x="2532762" y="2171181"/>
-            <a:ext cx="4078476" cy="3384000"/>
+            <a:off x="6039874" y="1576462"/>
+            <a:ext cx="3744416" cy="2880320"/>
           </a:xfrm>
           <a:prstGeom prst="rect">
             <a:avLst/>
           </a:prstGeom>
+          <a:solidFill>
+            <a:schemeClr val="bg1"/>
+          </a:solidFill>
+          <a:ln w="9525" cap="flat" cmpd="sng" algn="ctr">
+            <a:solidFill>
+              <a:srgbClr val="FFFFFF"/>
+            </a:solidFill>
+            <a:prstDash val="solid"/>
+            <a:round/>
+            <a:headEnd type="none" w="med" len="med"/>
+            <a:tailEnd type="none" w="med" len="med"/>
+          </a:ln>
+          <a:effectLst/>
+          <a:extLst/>
         </p:spPr>
-      </p:pic>
+        <p:txBody>
+          <a:bodyPr vert="horz" wrap="none" lIns="91440" tIns="45720" rIns="91440" bIns="45720" numCol="1" rtlCol="0" anchor="ctr" anchorCtr="0" compatLnSpc="1">
+            <a:prstTxWarp prst="textNoShape">
+              <a:avLst/>
+            </a:prstTxWarp>
+          </a:bodyPr>
+          <a:lstStyle/>
+          <a:p>
+            <a:pPr marL="0" marR="0" indent="0" algn="r" defTabSz="914400" rtl="0" eaLnBrk="1" fontAlgn="base" latinLnBrk="0" hangingPunct="1">
+              <a:lnSpc>
+                <a:spcPct val="100000"/>
+              </a:lnSpc>
+              <a:spcBef>
+                <a:spcPct val="0"/>
+              </a:spcBef>
+              <a:spcAft>
+                <a:spcPct val="0"/>
+              </a:spcAft>
+              <a:buClrTx/>
+              <a:buSzTx/>
+              <a:buFontTx/>
+              <a:buNone/>
+              <a:tabLst/>
+            </a:pPr>
+            <a:endParaRPr kumimoji="0" lang="de-DE" sz="2400" b="0" i="0" u="none" strike="noStrike" cap="none" normalizeH="0" baseline="0" smtClean="0">
+              <a:ln>
+                <a:noFill/>
+              </a:ln>
+              <a:solidFill>
+                <a:schemeClr val="tx1"/>
+              </a:solidFill>
+              <a:effectLst/>
+              <a:latin typeface="Times New Roman" pitchFamily="18" charset="0"/>
+            </a:endParaRPr>
+          </a:p>
+        </p:txBody>
+      </p:sp>
     </p:spTree>
     <p:extLst>
       <p:ext uri="{BB962C8B-B14F-4D97-AF65-F5344CB8AC3E}">
@@ -10031,25 +9962,6 @@
       </p:sp>
       <p:sp>
         <p:nvSpPr>
-          <p:cNvPr id="3" name="Inhaltsplatzhalter 2"/>
-          <p:cNvSpPr>
-            <a:spLocks noGrp="1"/>
-          </p:cNvSpPr>
-          <p:nvPr>
-            <p:ph idx="1"/>
-          </p:nvPr>
-        </p:nvSpPr>
-        <p:spPr/>
-        <p:txBody>
-          <a:bodyPr/>
-          <a:lstStyle/>
-          <a:p>
-            <a:endParaRPr lang="de-DE" dirty="0"/>
-          </a:p>
-        </p:txBody>
-      </p:sp>
-      <p:sp>
-        <p:nvSpPr>
           <p:cNvPr id="4" name="Foliennummernplatzhalter 3"/>
           <p:cNvSpPr>
             <a:spLocks noGrp="1"/>
@@ -10094,30 +10006,130 @@
           </a:p>
         </p:txBody>
       </p:sp>
-      <p:pic>
-        <p:nvPicPr>
-          <p:cNvPr id="6" name="Grafik 5"/>
-          <p:cNvPicPr>
-            <a:picLocks noChangeAspect="1"/>
-          </p:cNvPicPr>
+      <p:graphicFrame>
+        <p:nvGraphicFramePr>
+          <p:cNvPr id="7" name="Inhaltsplatzhalter 6"/>
+          <p:cNvGraphicFramePr>
+            <a:graphicFrameLocks noGrp="1" noChangeAspect="1"/>
+          </p:cNvGraphicFramePr>
+          <p:nvPr>
+            <p:ph idx="1"/>
+            <p:extLst>
+              <p:ext uri="{D42A27DB-BD31-4B8C-83A1-F6EECF244321}">
+                <p14:modId xmlns:p14="http://schemas.microsoft.com/office/powerpoint/2010/main" val="2060323094"/>
+              </p:ext>
+            </p:extLst>
+          </p:nvPr>
+        </p:nvGraphicFramePr>
+        <p:xfrm>
+          <a:off x="2438400" y="1916832"/>
+          <a:ext cx="8229600" cy="5484812"/>
+        </p:xfrm>
+        <a:graphic>
+          <a:graphicData uri="http://schemas.openxmlformats.org/presentationml/2006/ole">
+            <mc:AlternateContent xmlns:mc="http://schemas.openxmlformats.org/markup-compatibility/2006">
+              <mc:Choice xmlns:v="urn:schemas-microsoft-com:vml" Requires="v">
+                <p:oleObj spid="_x0000_s10243" name="Dokument" r:id="rId3" imgW="6087400" imgH="4057628" progId="Word.Document.12">
+                  <p:embed/>
+                </p:oleObj>
+              </mc:Choice>
+              <mc:Fallback>
+                <p:oleObj name="Dokument" r:id="rId3" imgW="6087400" imgH="4057628" progId="Word.Document.12">
+                  <p:embed/>
+                  <p:pic>
+                    <p:nvPicPr>
+                      <p:cNvPr id="0" name=""/>
+                      <p:cNvPicPr/>
+                      <p:nvPr/>
+                    </p:nvPicPr>
+                    <p:blipFill>
+                      <a:blip r:embed="rId4"/>
+                      <a:stretch>
+                        <a:fillRect/>
+                      </a:stretch>
+                    </p:blipFill>
+                    <p:spPr>
+                      <a:xfrm>
+                        <a:off x="2438400" y="1916832"/>
+                        <a:ext cx="8229600" cy="5484812"/>
+                      </a:xfrm>
+                      <a:prstGeom prst="rect">
+                        <a:avLst/>
+                      </a:prstGeom>
+                    </p:spPr>
+                  </p:pic>
+                </p:oleObj>
+              </mc:Fallback>
+            </mc:AlternateContent>
+          </a:graphicData>
+        </a:graphic>
+      </p:graphicFrame>
+      <p:sp>
+        <p:nvSpPr>
+          <p:cNvPr id="8" name="Rechteck 7"/>
+          <p:cNvSpPr/>
           <p:nvPr/>
-        </p:nvPicPr>
-        <p:blipFill>
-          <a:blip r:embed="rId2"/>
-          <a:stretch>
-            <a:fillRect/>
-          </a:stretch>
-        </p:blipFill>
-        <p:spPr>
+        </p:nvSpPr>
+        <p:spPr bwMode="auto">
           <a:xfrm>
-            <a:off x="2616259" y="2243181"/>
-            <a:ext cx="3559082" cy="3240000"/>
+            <a:off x="5868144" y="1417637"/>
+            <a:ext cx="5544616" cy="4258543"/>
           </a:xfrm>
           <a:prstGeom prst="rect">
             <a:avLst/>
           </a:prstGeom>
+          <a:solidFill>
+            <a:schemeClr val="bg1"/>
+          </a:solidFill>
+          <a:ln w="9525" cap="flat" cmpd="sng" algn="ctr">
+            <a:solidFill>
+              <a:srgbClr val="FFFFFF"/>
+            </a:solidFill>
+            <a:prstDash val="solid"/>
+            <a:round/>
+            <a:headEnd type="none" w="med" len="med"/>
+            <a:tailEnd type="none" w="med" len="med"/>
+          </a:ln>
+          <a:effectLst/>
+          <a:extLst/>
         </p:spPr>
-      </p:pic>
+        <p:txBody>
+          <a:bodyPr vert="horz" wrap="none" lIns="91440" tIns="45720" rIns="91440" bIns="45720" numCol="1" rtlCol="0" anchor="ctr" anchorCtr="0" compatLnSpc="1">
+            <a:prstTxWarp prst="textNoShape">
+              <a:avLst/>
+            </a:prstTxWarp>
+          </a:bodyPr>
+          <a:lstStyle/>
+          <a:p>
+            <a:pPr marL="0" marR="0" indent="0" algn="r" defTabSz="914400" rtl="0" eaLnBrk="1" fontAlgn="base" latinLnBrk="0" hangingPunct="1">
+              <a:lnSpc>
+                <a:spcPct val="100000"/>
+              </a:lnSpc>
+              <a:spcBef>
+                <a:spcPct val="0"/>
+              </a:spcBef>
+              <a:spcAft>
+                <a:spcPct val="0"/>
+              </a:spcAft>
+              <a:buClrTx/>
+              <a:buSzTx/>
+              <a:buFontTx/>
+              <a:buNone/>
+              <a:tabLst/>
+            </a:pPr>
+            <a:endParaRPr kumimoji="0" lang="de-DE" sz="2400" b="0" i="0" u="none" strike="noStrike" cap="none" normalizeH="0" baseline="0" smtClean="0">
+              <a:ln>
+                <a:noFill/>
+              </a:ln>
+              <a:solidFill>
+                <a:schemeClr val="tx1"/>
+              </a:solidFill>
+              <a:effectLst/>
+              <a:latin typeface="Times New Roman" pitchFamily="18" charset="0"/>
+            </a:endParaRPr>
+          </a:p>
+        </p:txBody>
+      </p:sp>
     </p:spTree>
     <p:extLst>
       <p:ext uri="{BB962C8B-B14F-4D97-AF65-F5344CB8AC3E}">
@@ -10181,25 +10193,6 @@
       </p:sp>
       <p:sp>
         <p:nvSpPr>
-          <p:cNvPr id="3" name="Inhaltsplatzhalter 2"/>
-          <p:cNvSpPr>
-            <a:spLocks noGrp="1"/>
-          </p:cNvSpPr>
-          <p:nvPr>
-            <p:ph idx="1"/>
-          </p:nvPr>
-        </p:nvSpPr>
-        <p:spPr/>
-        <p:txBody>
-          <a:bodyPr/>
-          <a:lstStyle/>
-          <a:p>
-            <a:endParaRPr lang="de-DE"/>
-          </a:p>
-        </p:txBody>
-      </p:sp>
-      <p:sp>
-        <p:nvSpPr>
           <p:cNvPr id="4" name="Foliennummernplatzhalter 3"/>
           <p:cNvSpPr>
             <a:spLocks noGrp="1"/>
@@ -10244,30 +10237,130 @@
           </a:p>
         </p:txBody>
       </p:sp>
-      <p:pic>
-        <p:nvPicPr>
-          <p:cNvPr id="6" name="Grafik 5"/>
-          <p:cNvPicPr>
-            <a:picLocks noChangeAspect="1"/>
-          </p:cNvPicPr>
+      <p:graphicFrame>
+        <p:nvGraphicFramePr>
+          <p:cNvPr id="7" name="Inhaltsplatzhalter 6"/>
+          <p:cNvGraphicFramePr>
+            <a:graphicFrameLocks noGrp="1" noChangeAspect="1"/>
+          </p:cNvGraphicFramePr>
+          <p:nvPr>
+            <p:ph idx="1"/>
+            <p:extLst>
+              <p:ext uri="{D42A27DB-BD31-4B8C-83A1-F6EECF244321}">
+                <p14:modId xmlns:p14="http://schemas.microsoft.com/office/powerpoint/2010/main" val="3813513580"/>
+              </p:ext>
+            </p:extLst>
+          </p:nvPr>
+        </p:nvGraphicFramePr>
+        <p:xfrm>
+          <a:off x="2051720" y="2708920"/>
+          <a:ext cx="8229600" cy="5484812"/>
+        </p:xfrm>
+        <a:graphic>
+          <a:graphicData uri="http://schemas.openxmlformats.org/presentationml/2006/ole">
+            <mc:AlternateContent xmlns:mc="http://schemas.openxmlformats.org/markup-compatibility/2006">
+              <mc:Choice xmlns:v="urn:schemas-microsoft-com:vml" Requires="v">
+                <p:oleObj spid="_x0000_s11266" name="Dokument" r:id="rId3" imgW="6087400" imgH="4057628" progId="Word.Document.12">
+                  <p:embed/>
+                </p:oleObj>
+              </mc:Choice>
+              <mc:Fallback>
+                <p:oleObj name="Dokument" r:id="rId3" imgW="6087400" imgH="4057628" progId="Word.Document.12">
+                  <p:embed/>
+                  <p:pic>
+                    <p:nvPicPr>
+                      <p:cNvPr id="0" name=""/>
+                      <p:cNvPicPr/>
+                      <p:nvPr/>
+                    </p:nvPicPr>
+                    <p:blipFill>
+                      <a:blip r:embed="rId4"/>
+                      <a:stretch>
+                        <a:fillRect/>
+                      </a:stretch>
+                    </p:blipFill>
+                    <p:spPr>
+                      <a:xfrm>
+                        <a:off x="2051720" y="2708920"/>
+                        <a:ext cx="8229600" cy="5484812"/>
+                      </a:xfrm>
+                      <a:prstGeom prst="rect">
+                        <a:avLst/>
+                      </a:prstGeom>
+                    </p:spPr>
+                  </p:pic>
+                </p:oleObj>
+              </mc:Fallback>
+            </mc:AlternateContent>
+          </a:graphicData>
+        </a:graphic>
+      </p:graphicFrame>
+      <p:sp>
+        <p:nvSpPr>
+          <p:cNvPr id="8" name="Rechteck 7"/>
+          <p:cNvSpPr/>
           <p:nvPr/>
-        </p:nvPicPr>
-        <p:blipFill>
-          <a:blip r:embed="rId2"/>
-          <a:stretch>
-            <a:fillRect/>
-          </a:stretch>
-        </p:blipFill>
-        <p:spPr>
+        </p:nvSpPr>
+        <p:spPr bwMode="auto">
           <a:xfrm>
-            <a:off x="2185482" y="2801181"/>
-            <a:ext cx="4773035" cy="2124000"/>
+            <a:off x="6814592" y="2228354"/>
+            <a:ext cx="3744416" cy="2880320"/>
           </a:xfrm>
           <a:prstGeom prst="rect">
             <a:avLst/>
           </a:prstGeom>
+          <a:solidFill>
+            <a:schemeClr val="bg1"/>
+          </a:solidFill>
+          <a:ln w="9525" cap="flat" cmpd="sng" algn="ctr">
+            <a:solidFill>
+              <a:srgbClr val="FFFFFF"/>
+            </a:solidFill>
+            <a:prstDash val="solid"/>
+            <a:round/>
+            <a:headEnd type="none" w="med" len="med"/>
+            <a:tailEnd type="none" w="med" len="med"/>
+          </a:ln>
+          <a:effectLst/>
+          <a:extLst/>
         </p:spPr>
-      </p:pic>
+        <p:txBody>
+          <a:bodyPr vert="horz" wrap="none" lIns="91440" tIns="45720" rIns="91440" bIns="45720" numCol="1" rtlCol="0" anchor="ctr" anchorCtr="0" compatLnSpc="1">
+            <a:prstTxWarp prst="textNoShape">
+              <a:avLst/>
+            </a:prstTxWarp>
+          </a:bodyPr>
+          <a:lstStyle/>
+          <a:p>
+            <a:pPr marL="0" marR="0" indent="0" algn="r" defTabSz="914400" rtl="0" eaLnBrk="1" fontAlgn="base" latinLnBrk="0" hangingPunct="1">
+              <a:lnSpc>
+                <a:spcPct val="100000"/>
+              </a:lnSpc>
+              <a:spcBef>
+                <a:spcPct val="0"/>
+              </a:spcBef>
+              <a:spcAft>
+                <a:spcPct val="0"/>
+              </a:spcAft>
+              <a:buClrTx/>
+              <a:buSzTx/>
+              <a:buFontTx/>
+              <a:buNone/>
+              <a:tabLst/>
+            </a:pPr>
+            <a:endParaRPr kumimoji="0" lang="de-DE" sz="2400" b="0" i="0" u="none" strike="noStrike" cap="none" normalizeH="0" baseline="0" smtClean="0">
+              <a:ln>
+                <a:noFill/>
+              </a:ln>
+              <a:solidFill>
+                <a:schemeClr val="tx1"/>
+              </a:solidFill>
+              <a:effectLst/>
+              <a:latin typeface="Times New Roman" pitchFamily="18" charset="0"/>
+            </a:endParaRPr>
+          </a:p>
+        </p:txBody>
+      </p:sp>
     </p:spTree>
     <p:extLst>
       <p:ext uri="{BB962C8B-B14F-4D97-AF65-F5344CB8AC3E}">
@@ -10316,35 +10409,21 @@
             <p:ph type="title"/>
           </p:nvPr>
         </p:nvSpPr>
-        <p:spPr/>
-        <p:txBody>
-          <a:bodyPr/>
-          <a:lstStyle/>
-          <a:p>
-            <a:r>
-              <a:rPr lang="de-DE" smtClean="0"/>
+        <p:spPr>
+          <a:xfrm>
+            <a:off x="461651" y="2780928"/>
+            <a:ext cx="8229600" cy="1143000"/>
+          </a:xfrm>
+        </p:spPr>
+        <p:txBody>
+          <a:bodyPr/>
+          <a:lstStyle/>
+          <a:p>
+            <a:r>
+              <a:rPr lang="de-DE" dirty="0" smtClean="0"/>
               <a:t>Ende</a:t>
             </a:r>
-            <a:endParaRPr lang="de-DE"/>
-          </a:p>
-        </p:txBody>
-      </p:sp>
-      <p:sp>
-        <p:nvSpPr>
-          <p:cNvPr id="3" name="Inhaltsplatzhalter 2"/>
-          <p:cNvSpPr>
-            <a:spLocks noGrp="1"/>
-          </p:cNvSpPr>
-          <p:nvPr>
-            <p:ph idx="1"/>
-          </p:nvPr>
-        </p:nvSpPr>
-        <p:spPr/>
-        <p:txBody>
-          <a:bodyPr/>
-          <a:lstStyle/>
-          <a:p>
-            <a:endParaRPr lang="de-DE"/>
+            <a:endParaRPr lang="de-DE" dirty="0"/>
           </a:p>
         </p:txBody>
       </p:sp>
@@ -10660,6 +10739,13 @@
     <a:masterClrMapping/>
   </p:clrMapOvr>
   <p:transition spd="med"/>
+  <p:timing>
+    <p:tnLst>
+      <p:par>
+        <p:cTn id="1" dur="indefinite" restart="never" nodeType="tmRoot"/>
+      </p:par>
+    </p:tnLst>
+  </p:timing>
 </p:sld>
 </file>
 
@@ -10772,30 +10858,129 @@
           </a:p>
         </p:txBody>
       </p:sp>
-      <p:pic>
-        <p:nvPicPr>
-          <p:cNvPr id="6" name="Grafik 5"/>
-          <p:cNvPicPr>
-            <a:picLocks noChangeAspect="1"/>
-          </p:cNvPicPr>
+      <p:graphicFrame>
+        <p:nvGraphicFramePr>
+          <p:cNvPr id="10" name="Objekt 9"/>
+          <p:cNvGraphicFramePr>
+            <a:graphicFrameLocks noChangeAspect="1"/>
+          </p:cNvGraphicFramePr>
+          <p:nvPr>
+            <p:extLst>
+              <p:ext uri="{D42A27DB-BD31-4B8C-83A1-F6EECF244321}">
+                <p14:modId xmlns:p14="http://schemas.microsoft.com/office/powerpoint/2010/main" val="2757616424"/>
+              </p:ext>
+            </p:extLst>
+          </p:nvPr>
+        </p:nvGraphicFramePr>
+        <p:xfrm>
+          <a:off x="1545519" y="2663825"/>
+          <a:ext cx="6088062" cy="4057650"/>
+        </p:xfrm>
+        <a:graphic>
+          <a:graphicData uri="http://schemas.openxmlformats.org/presentationml/2006/ole">
+            <mc:AlternateContent xmlns:mc="http://schemas.openxmlformats.org/markup-compatibility/2006">
+              <mc:Choice xmlns:v="urn:schemas-microsoft-com:vml" Requires="v">
+                <p:oleObj spid="_x0000_s7172" name="Dokument" r:id="rId3" imgW="6087400" imgH="4057628" progId="Word.Document.12">
+                  <p:embed/>
+                </p:oleObj>
+              </mc:Choice>
+              <mc:Fallback>
+                <p:oleObj name="Dokument" r:id="rId3" imgW="6087400" imgH="4057628" progId="Word.Document.12">
+                  <p:embed/>
+                  <p:pic>
+                    <p:nvPicPr>
+                      <p:cNvPr id="0" name=""/>
+                      <p:cNvPicPr/>
+                      <p:nvPr/>
+                    </p:nvPicPr>
+                    <p:blipFill>
+                      <a:blip r:embed="rId4"/>
+                      <a:stretch>
+                        <a:fillRect/>
+                      </a:stretch>
+                    </p:blipFill>
+                    <p:spPr>
+                      <a:xfrm>
+                        <a:off x="1545519" y="2663825"/>
+                        <a:ext cx="6088062" cy="4057650"/>
+                      </a:xfrm>
+                      <a:prstGeom prst="rect">
+                        <a:avLst/>
+                      </a:prstGeom>
+                    </p:spPr>
+                  </p:pic>
+                </p:oleObj>
+              </mc:Fallback>
+            </mc:AlternateContent>
+          </a:graphicData>
+        </a:graphic>
+      </p:graphicFrame>
+      <p:sp>
+        <p:nvSpPr>
+          <p:cNvPr id="9" name="Rechteck 8"/>
+          <p:cNvSpPr/>
           <p:nvPr/>
-        </p:nvPicPr>
-        <p:blipFill>
-          <a:blip r:embed="rId2"/>
-          <a:stretch>
-            <a:fillRect/>
-          </a:stretch>
-        </p:blipFill>
-        <p:spPr>
+        </p:nvSpPr>
+        <p:spPr bwMode="auto">
           <a:xfrm>
-            <a:off x="1670783" y="2924944"/>
-            <a:ext cx="5450033" cy="2088000"/>
+            <a:off x="5761373" y="2103339"/>
+            <a:ext cx="3744416" cy="2880320"/>
           </a:xfrm>
           <a:prstGeom prst="rect">
             <a:avLst/>
           </a:prstGeom>
+          <a:solidFill>
+            <a:schemeClr val="bg1"/>
+          </a:solidFill>
+          <a:ln w="9525" cap="flat" cmpd="sng" algn="ctr">
+            <a:solidFill>
+              <a:srgbClr val="FFFFFF"/>
+            </a:solidFill>
+            <a:prstDash val="solid"/>
+            <a:round/>
+            <a:headEnd type="none" w="med" len="med"/>
+            <a:tailEnd type="none" w="med" len="med"/>
+          </a:ln>
+          <a:effectLst/>
+          <a:extLst/>
         </p:spPr>
-      </p:pic>
+        <p:txBody>
+          <a:bodyPr vert="horz" wrap="none" lIns="91440" tIns="45720" rIns="91440" bIns="45720" numCol="1" rtlCol="0" anchor="ctr" anchorCtr="0" compatLnSpc="1">
+            <a:prstTxWarp prst="textNoShape">
+              <a:avLst/>
+            </a:prstTxWarp>
+          </a:bodyPr>
+          <a:lstStyle/>
+          <a:p>
+            <a:pPr marL="0" marR="0" indent="0" algn="r" defTabSz="914400" rtl="0" eaLnBrk="1" fontAlgn="base" latinLnBrk="0" hangingPunct="1">
+              <a:lnSpc>
+                <a:spcPct val="100000"/>
+              </a:lnSpc>
+              <a:spcBef>
+                <a:spcPct val="0"/>
+              </a:spcBef>
+              <a:spcAft>
+                <a:spcPct val="0"/>
+              </a:spcAft>
+              <a:buClrTx/>
+              <a:buSzTx/>
+              <a:buFontTx/>
+              <a:buNone/>
+              <a:tabLst/>
+            </a:pPr>
+            <a:endParaRPr kumimoji="0" lang="de-DE" sz="2400" b="0" i="0" u="none" strike="noStrike" cap="none" normalizeH="0" baseline="0" smtClean="0">
+              <a:ln>
+                <a:noFill/>
+              </a:ln>
+              <a:solidFill>
+                <a:schemeClr val="tx1"/>
+              </a:solidFill>
+              <a:effectLst/>
+              <a:latin typeface="Times New Roman" pitchFamily="18" charset="0"/>
+            </a:endParaRPr>
+          </a:p>
+        </p:txBody>
+      </p:sp>
     </p:spTree>
     <p:extLst>
       <p:ext uri="{BB962C8B-B14F-4D97-AF65-F5344CB8AC3E}">
@@ -10807,6 +10992,13 @@
     <a:masterClrMapping/>
   </p:clrMapOvr>
   <p:transition spd="med"/>
+  <p:timing>
+    <p:tnLst>
+      <p:par>
+        <p:cTn id="1" dur="indefinite" restart="never" nodeType="tmRoot"/>
+      </p:par>
+    </p:tnLst>
+  </p:timing>
 </p:sld>
 </file>
 
@@ -10850,32 +11042,6 @@
           </a:p>
         </p:txBody>
       </p:sp>
-      <p:pic>
-        <p:nvPicPr>
-          <p:cNvPr id="6" name="Inhaltsplatzhalter 5"/>
-          <p:cNvPicPr>
-            <a:picLocks noGrp="1" noChangeAspect="1"/>
-          </p:cNvPicPr>
-          <p:nvPr>
-            <p:ph idx="1"/>
-          </p:nvPr>
-        </p:nvPicPr>
-        <p:blipFill>
-          <a:blip r:embed="rId2"/>
-          <a:stretch>
-            <a:fillRect/>
-          </a:stretch>
-        </p:blipFill>
-        <p:spPr>
-          <a:xfrm>
-            <a:off x="2420709" y="3195029"/>
-            <a:ext cx="4302582" cy="468000"/>
-          </a:xfrm>
-          <a:prstGeom prst="rect">
-            <a:avLst/>
-          </a:prstGeom>
-        </p:spPr>
-      </p:pic>
       <p:sp>
         <p:nvSpPr>
           <p:cNvPr id="4" name="Foliennummernplatzhalter 3"/>
@@ -10922,6 +11088,64 @@
           </a:p>
         </p:txBody>
       </p:sp>
+      <p:graphicFrame>
+        <p:nvGraphicFramePr>
+          <p:cNvPr id="9" name="Inhaltsplatzhalter 8"/>
+          <p:cNvGraphicFramePr>
+            <a:graphicFrameLocks noGrp="1" noChangeAspect="1"/>
+          </p:cNvGraphicFramePr>
+          <p:nvPr>
+            <p:ph idx="1"/>
+            <p:extLst>
+              <p:ext uri="{D42A27DB-BD31-4B8C-83A1-F6EECF244321}">
+                <p14:modId xmlns:p14="http://schemas.microsoft.com/office/powerpoint/2010/main" val="1292385868"/>
+              </p:ext>
+            </p:extLst>
+          </p:nvPr>
+        </p:nvGraphicFramePr>
+        <p:xfrm>
+          <a:off x="3419872" y="3284984"/>
+          <a:ext cx="6791325" cy="4525963"/>
+        </p:xfrm>
+        <a:graphic>
+          <a:graphicData uri="http://schemas.openxmlformats.org/presentationml/2006/ole">
+            <mc:AlternateContent xmlns:mc="http://schemas.openxmlformats.org/markup-compatibility/2006">
+              <mc:Choice xmlns:v="urn:schemas-microsoft-com:vml" Requires="v">
+                <p:oleObj spid="_x0000_s8196" name="Dokument" r:id="rId3" imgW="6087400" imgH="4057628" progId="Word.Document.12">
+                  <p:embed/>
+                </p:oleObj>
+              </mc:Choice>
+              <mc:Fallback>
+                <p:oleObj name="Dokument" r:id="rId3" imgW="6087400" imgH="4057628" progId="Word.Document.12">
+                  <p:embed/>
+                  <p:pic>
+                    <p:nvPicPr>
+                      <p:cNvPr id="0" name=""/>
+                      <p:cNvPicPr/>
+                      <p:nvPr/>
+                    </p:nvPicPr>
+                    <p:blipFill>
+                      <a:blip r:embed="rId4"/>
+                      <a:stretch>
+                        <a:fillRect/>
+                      </a:stretch>
+                    </p:blipFill>
+                    <p:spPr>
+                      <a:xfrm>
+                        <a:off x="3419872" y="3284984"/>
+                        <a:ext cx="6791325" cy="4525963"/>
+                      </a:xfrm>
+                      <a:prstGeom prst="rect">
+                        <a:avLst/>
+                      </a:prstGeom>
+                    </p:spPr>
+                  </p:pic>
+                </p:oleObj>
+              </mc:Fallback>
+            </mc:AlternateContent>
+          </a:graphicData>
+        </a:graphic>
+      </p:graphicFrame>
     </p:spTree>
     <p:extLst>
       <p:ext uri="{BB962C8B-B14F-4D97-AF65-F5344CB8AC3E}">
@@ -10933,6 +11157,13 @@
     <a:masterClrMapping/>
   </p:clrMapOvr>
   <p:transition spd="med"/>
+  <p:timing>
+    <p:tnLst>
+      <p:par>
+        <p:cTn id="1" dur="indefinite" restart="never" nodeType="tmRoot"/>
+      </p:par>
+    </p:tnLst>
+  </p:timing>
 </p:sld>
 </file>
 
@@ -11370,7 +11601,7 @@
           <a:graphicData uri="http://schemas.openxmlformats.org/presentationml/2006/ole">
             <mc:AlternateContent xmlns:mc="http://schemas.openxmlformats.org/markup-compatibility/2006">
               <mc:Choice xmlns:v="urn:schemas-microsoft-com:vml" Requires="v">
-                <p:oleObj spid="_x0000_s1106" name="Dokument" r:id="rId4" imgW="6100084" imgH="4063581" progId="Word.Document.12">
+                <p:oleObj spid="_x0000_s1108" name="Dokument" r:id="rId4" imgW="6100084" imgH="4063581" progId="Word.Document.12">
                   <p:embed/>
                 </p:oleObj>
               </mc:Choice>

</xml_diff>